<commit_message>
update use of matrix::combine to reflect reverse matrix math
</commit_message>
<xml_diff>
--- a/docs/documentation.pptx
+++ b/docs/documentation.pptx
@@ -4,6 +4,9 @@
   <p:sldMasterIdLst>
     <p:sldMasterId id="2147483648" r:id="rId1"/>
   </p:sldMasterIdLst>
+  <p:notesMasterIdLst>
+    <p:notesMasterId r:id="rId10"/>
+  </p:notesMasterIdLst>
   <p:sldIdLst>
     <p:sldId id="256" r:id="rId2"/>
     <p:sldId id="257" r:id="rId3"/>
@@ -11,6 +14,8 @@
     <p:sldId id="259" r:id="rId5"/>
     <p:sldId id="260" r:id="rId6"/>
     <p:sldId id="261" r:id="rId7"/>
+    <p:sldId id="262" r:id="rId8"/>
+    <p:sldId id="263" r:id="rId9"/>
   </p:sldIdLst>
   <p:sldSz cx="12192000" cy="6858000"/>
   <p:notesSz cx="6858000" cy="9144000"/>
@@ -110,11 +115,464 @@
     </a:lvl9pPr>
   </p:defaultTextStyle>
   <p:extLst>
+    <p:ext uri="{521415D9-36F7-43E2-AB2F-B90AF26B5E84}">
+      <p14:sectionLst xmlns:p14="http://schemas.microsoft.com/office/powerpoint/2010/main">
+        <p14:section name="Default Section" id="{D58A53C5-7FB4-4A18-AA7A-19340A1EFFF0}">
+          <p14:sldIdLst>
+            <p14:sldId id="256"/>
+            <p14:sldId id="257"/>
+            <p14:sldId id="258"/>
+            <p14:sldId id="259"/>
+            <p14:sldId id="260"/>
+            <p14:sldId id="261"/>
+          </p14:sldIdLst>
+        </p14:section>
+        <p14:section name="sphere" id="{D9FD14F6-0B16-49AA-96B2-1CB9224E32BD}">
+          <p14:sldIdLst>
+            <p14:sldId id="262"/>
+            <p14:sldId id="263"/>
+          </p14:sldIdLst>
+        </p14:section>
+      </p14:sectionLst>
+    </p:ext>
     <p:ext uri="{EFAFB233-063F-42B5-8137-9DF3F51BA10A}">
       <p15:sldGuideLst xmlns:p15="http://schemas.microsoft.com/office/powerpoint/2012/main"/>
     </p:ext>
   </p:extLst>
 </p:presentation>
+</file>
+
+<file path=ppt/notesMasters/notesMaster1.xml><?xml version="1.0" encoding="utf-8"?>
+<p:notesMaster xmlns:a="http://schemas.openxmlformats.org/drawingml/2006/main" xmlns:r="http://schemas.openxmlformats.org/officeDocument/2006/relationships" xmlns:p="http://schemas.openxmlformats.org/presentationml/2006/main">
+  <p:cSld>
+    <p:bg>
+      <p:bgRef idx="1001">
+        <a:schemeClr val="bg1"/>
+      </p:bgRef>
+    </p:bg>
+    <p:spTree>
+      <p:nvGrpSpPr>
+        <p:cNvPr id="1" name=""/>
+        <p:cNvGrpSpPr/>
+        <p:nvPr/>
+      </p:nvGrpSpPr>
+      <p:grpSpPr>
+        <a:xfrm>
+          <a:off x="0" y="0"/>
+          <a:ext cx="0" cy="0"/>
+          <a:chOff x="0" y="0"/>
+          <a:chExt cx="0" cy="0"/>
+        </a:xfrm>
+      </p:grpSpPr>
+      <p:sp>
+        <p:nvSpPr>
+          <p:cNvPr id="2" name="Header Placeholder 1"/>
+          <p:cNvSpPr>
+            <a:spLocks noGrp="1"/>
+          </p:cNvSpPr>
+          <p:nvPr>
+            <p:ph type="hdr" sz="quarter"/>
+          </p:nvPr>
+        </p:nvSpPr>
+        <p:spPr>
+          <a:xfrm>
+            <a:off x="0" y="0"/>
+            <a:ext cx="2971800" cy="458788"/>
+          </a:xfrm>
+          <a:prstGeom prst="rect">
+            <a:avLst/>
+          </a:prstGeom>
+        </p:spPr>
+        <p:txBody>
+          <a:bodyPr vert="horz" lIns="91440" tIns="45720" rIns="91440" bIns="45720" rtlCol="0"/>
+          <a:lstStyle>
+            <a:lvl1pPr algn="l">
+              <a:defRPr sz="1200"/>
+            </a:lvl1pPr>
+          </a:lstStyle>
+          <a:p>
+            <a:endParaRPr lang="en-US"/>
+          </a:p>
+        </p:txBody>
+      </p:sp>
+      <p:sp>
+        <p:nvSpPr>
+          <p:cNvPr id="3" name="Date Placeholder 2"/>
+          <p:cNvSpPr>
+            <a:spLocks noGrp="1"/>
+          </p:cNvSpPr>
+          <p:nvPr>
+            <p:ph type="dt" idx="1"/>
+          </p:nvPr>
+        </p:nvSpPr>
+        <p:spPr>
+          <a:xfrm>
+            <a:off x="3884613" y="0"/>
+            <a:ext cx="2971800" cy="458788"/>
+          </a:xfrm>
+          <a:prstGeom prst="rect">
+            <a:avLst/>
+          </a:prstGeom>
+        </p:spPr>
+        <p:txBody>
+          <a:bodyPr vert="horz" lIns="91440" tIns="45720" rIns="91440" bIns="45720" rtlCol="0"/>
+          <a:lstStyle>
+            <a:lvl1pPr algn="r">
+              <a:defRPr sz="1200"/>
+            </a:lvl1pPr>
+          </a:lstStyle>
+          <a:p>
+            <a:fld id="{CCF00BB7-ABBE-422D-B859-7545CEDE1AD1}" type="datetimeFigureOut">
+              <a:rPr lang="en-US" smtClean="0"/>
+              <a:t>6/15/2025</a:t>
+            </a:fld>
+            <a:endParaRPr lang="en-US"/>
+          </a:p>
+        </p:txBody>
+      </p:sp>
+      <p:sp>
+        <p:nvSpPr>
+          <p:cNvPr id="4" name="Slide Image Placeholder 3"/>
+          <p:cNvSpPr>
+            <a:spLocks noGrp="1" noRot="1" noChangeAspect="1"/>
+          </p:cNvSpPr>
+          <p:nvPr>
+            <p:ph type="sldImg" idx="2"/>
+          </p:nvPr>
+        </p:nvSpPr>
+        <p:spPr>
+          <a:xfrm>
+            <a:off x="685800" y="1143000"/>
+            <a:ext cx="5486400" cy="3086100"/>
+          </a:xfrm>
+          <a:prstGeom prst="rect">
+            <a:avLst/>
+          </a:prstGeom>
+          <a:noFill/>
+          <a:ln w="12700">
+            <a:solidFill>
+              <a:prstClr val="black"/>
+            </a:solidFill>
+          </a:ln>
+        </p:spPr>
+        <p:txBody>
+          <a:bodyPr vert="horz" lIns="91440" tIns="45720" rIns="91440" bIns="45720" rtlCol="0" anchor="ctr"/>
+          <a:lstStyle/>
+          <a:p>
+            <a:endParaRPr lang="en-US"/>
+          </a:p>
+        </p:txBody>
+      </p:sp>
+      <p:sp>
+        <p:nvSpPr>
+          <p:cNvPr id="5" name="Notes Placeholder 4"/>
+          <p:cNvSpPr>
+            <a:spLocks noGrp="1"/>
+          </p:cNvSpPr>
+          <p:nvPr>
+            <p:ph type="body" sz="quarter" idx="3"/>
+          </p:nvPr>
+        </p:nvSpPr>
+        <p:spPr>
+          <a:xfrm>
+            <a:off x="685800" y="4400550"/>
+            <a:ext cx="5486400" cy="3600450"/>
+          </a:xfrm>
+          <a:prstGeom prst="rect">
+            <a:avLst/>
+          </a:prstGeom>
+        </p:spPr>
+        <p:txBody>
+          <a:bodyPr vert="horz" lIns="91440" tIns="45720" rIns="91440" bIns="45720" rtlCol="0"/>
+          <a:lstStyle/>
+          <a:p>
+            <a:pPr lvl="0"/>
+            <a:r>
+              <a:rPr lang="en-US"/>
+              <a:t>Click to edit Master text styles</a:t>
+            </a:r>
+          </a:p>
+          <a:p>
+            <a:pPr lvl="1"/>
+            <a:r>
+              <a:rPr lang="en-US"/>
+              <a:t>Second level</a:t>
+            </a:r>
+          </a:p>
+          <a:p>
+            <a:pPr lvl="2"/>
+            <a:r>
+              <a:rPr lang="en-US"/>
+              <a:t>Third level</a:t>
+            </a:r>
+          </a:p>
+          <a:p>
+            <a:pPr lvl="3"/>
+            <a:r>
+              <a:rPr lang="en-US"/>
+              <a:t>Fourth level</a:t>
+            </a:r>
+          </a:p>
+          <a:p>
+            <a:pPr lvl="4"/>
+            <a:r>
+              <a:rPr lang="en-US"/>
+              <a:t>Fifth level</a:t>
+            </a:r>
+          </a:p>
+        </p:txBody>
+      </p:sp>
+      <p:sp>
+        <p:nvSpPr>
+          <p:cNvPr id="6" name="Footer Placeholder 5"/>
+          <p:cNvSpPr>
+            <a:spLocks noGrp="1"/>
+          </p:cNvSpPr>
+          <p:nvPr>
+            <p:ph type="ftr" sz="quarter" idx="4"/>
+          </p:nvPr>
+        </p:nvSpPr>
+        <p:spPr>
+          <a:xfrm>
+            <a:off x="0" y="8685213"/>
+            <a:ext cx="2971800" cy="458787"/>
+          </a:xfrm>
+          <a:prstGeom prst="rect">
+            <a:avLst/>
+          </a:prstGeom>
+        </p:spPr>
+        <p:txBody>
+          <a:bodyPr vert="horz" lIns="91440" tIns="45720" rIns="91440" bIns="45720" rtlCol="0" anchor="b"/>
+          <a:lstStyle>
+            <a:lvl1pPr algn="l">
+              <a:defRPr sz="1200"/>
+            </a:lvl1pPr>
+          </a:lstStyle>
+          <a:p>
+            <a:endParaRPr lang="en-US"/>
+          </a:p>
+        </p:txBody>
+      </p:sp>
+      <p:sp>
+        <p:nvSpPr>
+          <p:cNvPr id="7" name="Slide Number Placeholder 6"/>
+          <p:cNvSpPr>
+            <a:spLocks noGrp="1"/>
+          </p:cNvSpPr>
+          <p:nvPr>
+            <p:ph type="sldNum" sz="quarter" idx="5"/>
+          </p:nvPr>
+        </p:nvSpPr>
+        <p:spPr>
+          <a:xfrm>
+            <a:off x="3884613" y="8685213"/>
+            <a:ext cx="2971800" cy="458787"/>
+          </a:xfrm>
+          <a:prstGeom prst="rect">
+            <a:avLst/>
+          </a:prstGeom>
+        </p:spPr>
+        <p:txBody>
+          <a:bodyPr vert="horz" lIns="91440" tIns="45720" rIns="91440" bIns="45720" rtlCol="0" anchor="b"/>
+          <a:lstStyle>
+            <a:lvl1pPr algn="r">
+              <a:defRPr sz="1200"/>
+            </a:lvl1pPr>
+          </a:lstStyle>
+          <a:p>
+            <a:fld id="{59DFD63C-DF69-4715-BEA9-19972F6DA759}" type="slidenum">
+              <a:rPr lang="en-US" smtClean="0"/>
+              <a:t>‹#›</a:t>
+            </a:fld>
+            <a:endParaRPr lang="en-US"/>
+          </a:p>
+        </p:txBody>
+      </p:sp>
+    </p:spTree>
+    <p:extLst>
+      <p:ext uri="{BB962C8B-B14F-4D97-AF65-F5344CB8AC3E}">
+        <p14:creationId xmlns:p14="http://schemas.microsoft.com/office/powerpoint/2010/main" val="3866278795"/>
+      </p:ext>
+    </p:extLst>
+  </p:cSld>
+  <p:clrMap bg1="lt1" tx1="dk1" bg2="lt2" tx2="dk2" accent1="accent1" accent2="accent2" accent3="accent3" accent4="accent4" accent5="accent5" accent6="accent6" hlink="hlink" folHlink="folHlink"/>
+  <p:notesStyle>
+    <a:lvl1pPr marL="0" algn="l" defTabSz="914400" rtl="0" eaLnBrk="1" latinLnBrk="0" hangingPunct="1">
+      <a:defRPr sz="1200" kern="1200">
+        <a:solidFill>
+          <a:schemeClr val="tx1"/>
+        </a:solidFill>
+        <a:latin typeface="+mn-lt"/>
+        <a:ea typeface="+mn-ea"/>
+        <a:cs typeface="+mn-cs"/>
+      </a:defRPr>
+    </a:lvl1pPr>
+    <a:lvl2pPr marL="457200" algn="l" defTabSz="914400" rtl="0" eaLnBrk="1" latinLnBrk="0" hangingPunct="1">
+      <a:defRPr sz="1200" kern="1200">
+        <a:solidFill>
+          <a:schemeClr val="tx1"/>
+        </a:solidFill>
+        <a:latin typeface="+mn-lt"/>
+        <a:ea typeface="+mn-ea"/>
+        <a:cs typeface="+mn-cs"/>
+      </a:defRPr>
+    </a:lvl2pPr>
+    <a:lvl3pPr marL="914400" algn="l" defTabSz="914400" rtl="0" eaLnBrk="1" latinLnBrk="0" hangingPunct="1">
+      <a:defRPr sz="1200" kern="1200">
+        <a:solidFill>
+          <a:schemeClr val="tx1"/>
+        </a:solidFill>
+        <a:latin typeface="+mn-lt"/>
+        <a:ea typeface="+mn-ea"/>
+        <a:cs typeface="+mn-cs"/>
+      </a:defRPr>
+    </a:lvl3pPr>
+    <a:lvl4pPr marL="1371600" algn="l" defTabSz="914400" rtl="0" eaLnBrk="1" latinLnBrk="0" hangingPunct="1">
+      <a:defRPr sz="1200" kern="1200">
+        <a:solidFill>
+          <a:schemeClr val="tx1"/>
+        </a:solidFill>
+        <a:latin typeface="+mn-lt"/>
+        <a:ea typeface="+mn-ea"/>
+        <a:cs typeface="+mn-cs"/>
+      </a:defRPr>
+    </a:lvl4pPr>
+    <a:lvl5pPr marL="1828800" algn="l" defTabSz="914400" rtl="0" eaLnBrk="1" latinLnBrk="0" hangingPunct="1">
+      <a:defRPr sz="1200" kern="1200">
+        <a:solidFill>
+          <a:schemeClr val="tx1"/>
+        </a:solidFill>
+        <a:latin typeface="+mn-lt"/>
+        <a:ea typeface="+mn-ea"/>
+        <a:cs typeface="+mn-cs"/>
+      </a:defRPr>
+    </a:lvl5pPr>
+    <a:lvl6pPr marL="2286000" algn="l" defTabSz="914400" rtl="0" eaLnBrk="1" latinLnBrk="0" hangingPunct="1">
+      <a:defRPr sz="1200" kern="1200">
+        <a:solidFill>
+          <a:schemeClr val="tx1"/>
+        </a:solidFill>
+        <a:latin typeface="+mn-lt"/>
+        <a:ea typeface="+mn-ea"/>
+        <a:cs typeface="+mn-cs"/>
+      </a:defRPr>
+    </a:lvl6pPr>
+    <a:lvl7pPr marL="2743200" algn="l" defTabSz="914400" rtl="0" eaLnBrk="1" latinLnBrk="0" hangingPunct="1">
+      <a:defRPr sz="1200" kern="1200">
+        <a:solidFill>
+          <a:schemeClr val="tx1"/>
+        </a:solidFill>
+        <a:latin typeface="+mn-lt"/>
+        <a:ea typeface="+mn-ea"/>
+        <a:cs typeface="+mn-cs"/>
+      </a:defRPr>
+    </a:lvl7pPr>
+    <a:lvl8pPr marL="3200400" algn="l" defTabSz="914400" rtl="0" eaLnBrk="1" latinLnBrk="0" hangingPunct="1">
+      <a:defRPr sz="1200" kern="1200">
+        <a:solidFill>
+          <a:schemeClr val="tx1"/>
+        </a:solidFill>
+        <a:latin typeface="+mn-lt"/>
+        <a:ea typeface="+mn-ea"/>
+        <a:cs typeface="+mn-cs"/>
+      </a:defRPr>
+    </a:lvl8pPr>
+    <a:lvl9pPr marL="3657600" algn="l" defTabSz="914400" rtl="0" eaLnBrk="1" latinLnBrk="0" hangingPunct="1">
+      <a:defRPr sz="1200" kern="1200">
+        <a:solidFill>
+          <a:schemeClr val="tx1"/>
+        </a:solidFill>
+        <a:latin typeface="+mn-lt"/>
+        <a:ea typeface="+mn-ea"/>
+        <a:cs typeface="+mn-cs"/>
+      </a:defRPr>
+    </a:lvl9pPr>
+  </p:notesStyle>
+</p:notesMaster>
+</file>
+
+<file path=ppt/notesSlides/notesSlide1.xml><?xml version="1.0" encoding="utf-8"?>
+<p:notes xmlns:a="http://schemas.openxmlformats.org/drawingml/2006/main" xmlns:r="http://schemas.openxmlformats.org/officeDocument/2006/relationships" xmlns:p="http://schemas.openxmlformats.org/presentationml/2006/main">
+  <p:cSld>
+    <p:spTree>
+      <p:nvGrpSpPr>
+        <p:cNvPr id="1" name=""/>
+        <p:cNvGrpSpPr/>
+        <p:nvPr/>
+      </p:nvGrpSpPr>
+      <p:grpSpPr>
+        <a:xfrm>
+          <a:off x="0" y="0"/>
+          <a:ext cx="0" cy="0"/>
+          <a:chOff x="0" y="0"/>
+          <a:chExt cx="0" cy="0"/>
+        </a:xfrm>
+      </p:grpSpPr>
+      <p:sp>
+        <p:nvSpPr>
+          <p:cNvPr id="2" name="Slide Image Placeholder 1"/>
+          <p:cNvSpPr>
+            <a:spLocks noGrp="1" noRot="1" noChangeAspect="1"/>
+          </p:cNvSpPr>
+          <p:nvPr>
+            <p:ph type="sldImg"/>
+          </p:nvPr>
+        </p:nvSpPr>
+        <p:spPr/>
+      </p:sp>
+      <p:sp>
+        <p:nvSpPr>
+          <p:cNvPr id="3" name="Notes Placeholder 2"/>
+          <p:cNvSpPr>
+            <a:spLocks noGrp="1"/>
+          </p:cNvSpPr>
+          <p:nvPr>
+            <p:ph type="body" idx="1"/>
+          </p:nvPr>
+        </p:nvSpPr>
+        <p:spPr/>
+        <p:txBody>
+          <a:bodyPr/>
+          <a:lstStyle/>
+          <a:p>
+            <a:endParaRPr lang="en-US" dirty="0"/>
+          </a:p>
+        </p:txBody>
+      </p:sp>
+      <p:sp>
+        <p:nvSpPr>
+          <p:cNvPr id="4" name="Slide Number Placeholder 3"/>
+          <p:cNvSpPr>
+            <a:spLocks noGrp="1"/>
+          </p:cNvSpPr>
+          <p:nvPr>
+            <p:ph type="sldNum" sz="quarter" idx="5"/>
+          </p:nvPr>
+        </p:nvSpPr>
+        <p:spPr/>
+        <p:txBody>
+          <a:bodyPr/>
+          <a:lstStyle/>
+          <a:p>
+            <a:fld id="{59DFD63C-DF69-4715-BEA9-19972F6DA759}" type="slidenum">
+              <a:rPr lang="en-US" smtClean="0"/>
+              <a:t>7</a:t>
+            </a:fld>
+            <a:endParaRPr lang="en-US"/>
+          </a:p>
+        </p:txBody>
+      </p:sp>
+    </p:spTree>
+    <p:extLst>
+      <p:ext uri="{BB962C8B-B14F-4D97-AF65-F5344CB8AC3E}">
+        <p14:creationId xmlns:p14="http://schemas.microsoft.com/office/powerpoint/2010/main" val="303775876"/>
+      </p:ext>
+    </p:extLst>
+  </p:cSld>
+  <p:clrMapOvr>
+    <a:masterClrMapping/>
+  </p:clrMapOvr>
+</p:notes>
 </file>
 
 <file path=ppt/slideLayouts/slideLayout1.xml><?xml version="1.0" encoding="utf-8"?>
@@ -264,7 +722,7 @@
           <a:p>
             <a:fld id="{C3B77EC8-255C-4E73-BE92-D907A410F579}" type="datetimeFigureOut">
               <a:rPr lang="en-US" smtClean="0"/>
-              <a:t>6/3/2025</a:t>
+              <a:t>6/15/2025</a:t>
             </a:fld>
             <a:endParaRPr lang="en-US"/>
           </a:p>
@@ -462,7 +920,7 @@
           <a:p>
             <a:fld id="{C3B77EC8-255C-4E73-BE92-D907A410F579}" type="datetimeFigureOut">
               <a:rPr lang="en-US" smtClean="0"/>
-              <a:t>6/3/2025</a:t>
+              <a:t>6/15/2025</a:t>
             </a:fld>
             <a:endParaRPr lang="en-US"/>
           </a:p>
@@ -670,7 +1128,7 @@
           <a:p>
             <a:fld id="{C3B77EC8-255C-4E73-BE92-D907A410F579}" type="datetimeFigureOut">
               <a:rPr lang="en-US" smtClean="0"/>
-              <a:t>6/3/2025</a:t>
+              <a:t>6/15/2025</a:t>
             </a:fld>
             <a:endParaRPr lang="en-US"/>
           </a:p>
@@ -868,7 +1326,7 @@
           <a:p>
             <a:fld id="{C3B77EC8-255C-4E73-BE92-D907A410F579}" type="datetimeFigureOut">
               <a:rPr lang="en-US" smtClean="0"/>
-              <a:t>6/3/2025</a:t>
+              <a:t>6/15/2025</a:t>
             </a:fld>
             <a:endParaRPr lang="en-US"/>
           </a:p>
@@ -1143,7 +1601,7 @@
           <a:p>
             <a:fld id="{C3B77EC8-255C-4E73-BE92-D907A410F579}" type="datetimeFigureOut">
               <a:rPr lang="en-US" smtClean="0"/>
-              <a:t>6/3/2025</a:t>
+              <a:t>6/15/2025</a:t>
             </a:fld>
             <a:endParaRPr lang="en-US"/>
           </a:p>
@@ -1408,7 +1866,7 @@
           <a:p>
             <a:fld id="{C3B77EC8-255C-4E73-BE92-D907A410F579}" type="datetimeFigureOut">
               <a:rPr lang="en-US" smtClean="0"/>
-              <a:t>6/3/2025</a:t>
+              <a:t>6/15/2025</a:t>
             </a:fld>
             <a:endParaRPr lang="en-US"/>
           </a:p>
@@ -1820,7 +2278,7 @@
           <a:p>
             <a:fld id="{C3B77EC8-255C-4E73-BE92-D907A410F579}" type="datetimeFigureOut">
               <a:rPr lang="en-US" smtClean="0"/>
-              <a:t>6/3/2025</a:t>
+              <a:t>6/15/2025</a:t>
             </a:fld>
             <a:endParaRPr lang="en-US"/>
           </a:p>
@@ -1961,7 +2419,7 @@
           <a:p>
             <a:fld id="{C3B77EC8-255C-4E73-BE92-D907A410F579}" type="datetimeFigureOut">
               <a:rPr lang="en-US" smtClean="0"/>
-              <a:t>6/3/2025</a:t>
+              <a:t>6/15/2025</a:t>
             </a:fld>
             <a:endParaRPr lang="en-US"/>
           </a:p>
@@ -2074,7 +2532,7 @@
           <a:p>
             <a:fld id="{C3B77EC8-255C-4E73-BE92-D907A410F579}" type="datetimeFigureOut">
               <a:rPr lang="en-US" smtClean="0"/>
-              <a:t>6/3/2025</a:t>
+              <a:t>6/15/2025</a:t>
             </a:fld>
             <a:endParaRPr lang="en-US"/>
           </a:p>
@@ -2385,7 +2843,7 @@
           <a:p>
             <a:fld id="{C3B77EC8-255C-4E73-BE92-D907A410F579}" type="datetimeFigureOut">
               <a:rPr lang="en-US" smtClean="0"/>
-              <a:t>6/3/2025</a:t>
+              <a:t>6/15/2025</a:t>
             </a:fld>
             <a:endParaRPr lang="en-US"/>
           </a:p>
@@ -2673,7 +3131,7 @@
           <a:p>
             <a:fld id="{C3B77EC8-255C-4E73-BE92-D907A410F579}" type="datetimeFigureOut">
               <a:rPr lang="en-US" smtClean="0"/>
-              <a:t>6/3/2025</a:t>
+              <a:t>6/15/2025</a:t>
             </a:fld>
             <a:endParaRPr lang="en-US"/>
           </a:p>
@@ -2914,7 +3372,7 @@
           <a:p>
             <a:fld id="{C3B77EC8-255C-4E73-BE92-D907A410F579}" type="datetimeFigureOut">
               <a:rPr lang="en-US" smtClean="0"/>
-              <a:t>6/3/2025</a:t>
+              <a:t>6/15/2025</a:t>
             </a:fld>
             <a:endParaRPr lang="en-US"/>
           </a:p>
@@ -6802,6 +7260,688 @@
     <p:extLst>
       <p:ext uri="{BB962C8B-B14F-4D97-AF65-F5344CB8AC3E}">
         <p14:creationId xmlns:p14="http://schemas.microsoft.com/office/powerpoint/2010/main" val="851521964"/>
+      </p:ext>
+    </p:extLst>
+  </p:cSld>
+  <p:clrMapOvr>
+    <a:masterClrMapping/>
+  </p:clrMapOvr>
+</p:sld>
+</file>
+
+<file path=ppt/slides/slide7.xml><?xml version="1.0" encoding="utf-8"?>
+<p:sld xmlns:a="http://schemas.openxmlformats.org/drawingml/2006/main" xmlns:r="http://schemas.openxmlformats.org/officeDocument/2006/relationships" xmlns:p="http://schemas.openxmlformats.org/presentationml/2006/main">
+  <p:cSld>
+    <p:spTree>
+      <p:nvGrpSpPr>
+        <p:cNvPr id="1" name=""/>
+        <p:cNvGrpSpPr/>
+        <p:nvPr/>
+      </p:nvGrpSpPr>
+      <p:grpSpPr>
+        <a:xfrm>
+          <a:off x="0" y="0"/>
+          <a:ext cx="0" cy="0"/>
+          <a:chOff x="0" y="0"/>
+          <a:chExt cx="0" cy="0"/>
+        </a:xfrm>
+      </p:grpSpPr>
+      <p:sp>
+        <p:nvSpPr>
+          <p:cNvPr id="4" name="TextBox 3">
+            <a:extLst>
+              <a:ext uri="{FF2B5EF4-FFF2-40B4-BE49-F238E27FC236}">
+                <a16:creationId xmlns:a16="http://schemas.microsoft.com/office/drawing/2014/main" id="{48443224-39BC-6D28-8A38-1E6B1CB9C913}"/>
+              </a:ext>
+            </a:extLst>
+          </p:cNvPr>
+          <p:cNvSpPr txBox="1"/>
+          <p:nvPr/>
+        </p:nvSpPr>
+        <p:spPr>
+          <a:xfrm>
+            <a:off x="2075688" y="1207008"/>
+            <a:ext cx="2171107" cy="646331"/>
+          </a:xfrm>
+          <a:prstGeom prst="rect">
+            <a:avLst/>
+          </a:prstGeom>
+          <a:noFill/>
+        </p:spPr>
+        <p:txBody>
+          <a:bodyPr wrap="none" rtlCol="0">
+            <a:spAutoFit/>
+          </a:bodyPr>
+          <a:lstStyle/>
+          <a:p>
+            <a:r>
+              <a:rPr lang="en-US" dirty="0"/>
+              <a:t>Sphere rasterization</a:t>
+            </a:r>
+          </a:p>
+          <a:p>
+            <a:r>
+              <a:rPr lang="en-US" dirty="0"/>
+              <a:t>Find min and max X</a:t>
+            </a:r>
+          </a:p>
+        </p:txBody>
+      </p:sp>
+      <p:sp>
+        <p:nvSpPr>
+          <p:cNvPr id="5" name="Oval 4">
+            <a:extLst>
+              <a:ext uri="{FF2B5EF4-FFF2-40B4-BE49-F238E27FC236}">
+                <a16:creationId xmlns:a16="http://schemas.microsoft.com/office/drawing/2014/main" id="{7E801081-F0E1-C18C-741E-136EC4E0CE4E}"/>
+              </a:ext>
+            </a:extLst>
+          </p:cNvPr>
+          <p:cNvSpPr/>
+          <p:nvPr/>
+        </p:nvSpPr>
+        <p:spPr>
+          <a:xfrm>
+            <a:off x="6096000" y="246888"/>
+            <a:ext cx="3560064" cy="3483864"/>
+          </a:xfrm>
+          <a:prstGeom prst="ellipse">
+            <a:avLst/>
+          </a:prstGeom>
+        </p:spPr>
+        <p:style>
+          <a:lnRef idx="2">
+            <a:schemeClr val="accent1">
+              <a:shade val="15000"/>
+            </a:schemeClr>
+          </a:lnRef>
+          <a:fillRef idx="1">
+            <a:schemeClr val="accent1"/>
+          </a:fillRef>
+          <a:effectRef idx="0">
+            <a:schemeClr val="accent1"/>
+          </a:effectRef>
+          <a:fontRef idx="minor">
+            <a:schemeClr val="lt1"/>
+          </a:fontRef>
+        </p:style>
+        <p:txBody>
+          <a:bodyPr rtlCol="0" anchor="ctr"/>
+          <a:lstStyle/>
+          <a:p>
+            <a:pPr algn="ctr"/>
+            <a:endParaRPr lang="en-US"/>
+          </a:p>
+        </p:txBody>
+      </p:sp>
+      <p:cxnSp>
+        <p:nvCxnSpPr>
+          <p:cNvPr id="7" name="Straight Arrow Connector 6">
+            <a:extLst>
+              <a:ext uri="{FF2B5EF4-FFF2-40B4-BE49-F238E27FC236}">
+                <a16:creationId xmlns:a16="http://schemas.microsoft.com/office/drawing/2014/main" id="{1D17DBF3-F52E-5F6F-E703-F0F97BB0171D}"/>
+              </a:ext>
+            </a:extLst>
+          </p:cNvPr>
+          <p:cNvCxnSpPr>
+            <a:cxnSpLocks/>
+          </p:cNvCxnSpPr>
+          <p:nvPr/>
+        </p:nvCxnSpPr>
+        <p:spPr>
+          <a:xfrm flipH="1" flipV="1">
+            <a:off x="6272784" y="2752344"/>
+            <a:ext cx="1673352" cy="2807208"/>
+          </a:xfrm>
+          <a:prstGeom prst="straightConnector1">
+            <a:avLst/>
+          </a:prstGeom>
+          <a:ln>
+            <a:solidFill>
+              <a:srgbClr val="92D050"/>
+            </a:solidFill>
+            <a:tailEnd type="triangle"/>
+          </a:ln>
+        </p:spPr>
+        <p:style>
+          <a:lnRef idx="1">
+            <a:schemeClr val="accent6"/>
+          </a:lnRef>
+          <a:fillRef idx="0">
+            <a:schemeClr val="accent6"/>
+          </a:fillRef>
+          <a:effectRef idx="0">
+            <a:schemeClr val="accent6"/>
+          </a:effectRef>
+          <a:fontRef idx="minor">
+            <a:schemeClr val="tx1"/>
+          </a:fontRef>
+        </p:style>
+      </p:cxnSp>
+      <p:cxnSp>
+        <p:nvCxnSpPr>
+          <p:cNvPr id="8" name="Straight Arrow Connector 7">
+            <a:extLst>
+              <a:ext uri="{FF2B5EF4-FFF2-40B4-BE49-F238E27FC236}">
+                <a16:creationId xmlns:a16="http://schemas.microsoft.com/office/drawing/2014/main" id="{D41314CB-F4C0-687A-6780-D7A53FE46D90}"/>
+              </a:ext>
+            </a:extLst>
+          </p:cNvPr>
+          <p:cNvCxnSpPr>
+            <a:cxnSpLocks/>
+          </p:cNvCxnSpPr>
+          <p:nvPr/>
+        </p:nvCxnSpPr>
+        <p:spPr>
+          <a:xfrm flipV="1">
+            <a:off x="7946136" y="2937164"/>
+            <a:ext cx="1452232" cy="2622388"/>
+          </a:xfrm>
+          <a:prstGeom prst="straightConnector1">
+            <a:avLst/>
+          </a:prstGeom>
+          <a:ln>
+            <a:solidFill>
+              <a:srgbClr val="92D050"/>
+            </a:solidFill>
+            <a:tailEnd type="triangle"/>
+          </a:ln>
+        </p:spPr>
+        <p:style>
+          <a:lnRef idx="1">
+            <a:schemeClr val="accent6"/>
+          </a:lnRef>
+          <a:fillRef idx="0">
+            <a:schemeClr val="accent6"/>
+          </a:fillRef>
+          <a:effectRef idx="0">
+            <a:schemeClr val="accent6"/>
+          </a:effectRef>
+          <a:fontRef idx="minor">
+            <a:schemeClr val="tx1"/>
+          </a:fontRef>
+        </p:style>
+      </p:cxnSp>
+      <p:cxnSp>
+        <p:nvCxnSpPr>
+          <p:cNvPr id="12" name="Straight Arrow Connector 11">
+            <a:extLst>
+              <a:ext uri="{FF2B5EF4-FFF2-40B4-BE49-F238E27FC236}">
+                <a16:creationId xmlns:a16="http://schemas.microsoft.com/office/drawing/2014/main" id="{3289FFFA-0DAF-67CF-03AA-0878951ADA92}"/>
+              </a:ext>
+            </a:extLst>
+          </p:cNvPr>
+          <p:cNvCxnSpPr>
+            <a:cxnSpLocks/>
+            <a:endCxn id="5" idx="2"/>
+          </p:cNvCxnSpPr>
+          <p:nvPr/>
+        </p:nvCxnSpPr>
+        <p:spPr>
+          <a:xfrm flipH="1" flipV="1">
+            <a:off x="6096000" y="1988820"/>
+            <a:ext cx="1850136" cy="3570732"/>
+          </a:xfrm>
+          <a:prstGeom prst="straightConnector1">
+            <a:avLst/>
+          </a:prstGeom>
+          <a:ln>
+            <a:solidFill>
+              <a:srgbClr val="FF0000"/>
+            </a:solidFill>
+            <a:tailEnd type="triangle"/>
+          </a:ln>
+        </p:spPr>
+        <p:style>
+          <a:lnRef idx="1">
+            <a:schemeClr val="accent6"/>
+          </a:lnRef>
+          <a:fillRef idx="0">
+            <a:schemeClr val="accent6"/>
+          </a:fillRef>
+          <a:effectRef idx="0">
+            <a:schemeClr val="accent6"/>
+          </a:effectRef>
+          <a:fontRef idx="minor">
+            <a:schemeClr val="tx1"/>
+          </a:fontRef>
+        </p:style>
+      </p:cxnSp>
+      <p:cxnSp>
+        <p:nvCxnSpPr>
+          <p:cNvPr id="15" name="Straight Arrow Connector 14">
+            <a:extLst>
+              <a:ext uri="{FF2B5EF4-FFF2-40B4-BE49-F238E27FC236}">
+                <a16:creationId xmlns:a16="http://schemas.microsoft.com/office/drawing/2014/main" id="{13B12D0F-A825-774A-1BE9-BA35A40AFC06}"/>
+              </a:ext>
+            </a:extLst>
+          </p:cNvPr>
+          <p:cNvCxnSpPr>
+            <a:cxnSpLocks/>
+            <a:endCxn id="5" idx="6"/>
+          </p:cNvCxnSpPr>
+          <p:nvPr/>
+        </p:nvCxnSpPr>
+        <p:spPr>
+          <a:xfrm flipV="1">
+            <a:off x="7946136" y="1988820"/>
+            <a:ext cx="1709928" cy="3570732"/>
+          </a:xfrm>
+          <a:prstGeom prst="straightConnector1">
+            <a:avLst/>
+          </a:prstGeom>
+          <a:ln>
+            <a:solidFill>
+              <a:srgbClr val="FF0000"/>
+            </a:solidFill>
+            <a:tailEnd type="triangle"/>
+          </a:ln>
+        </p:spPr>
+        <p:style>
+          <a:lnRef idx="1">
+            <a:schemeClr val="accent6"/>
+          </a:lnRef>
+          <a:fillRef idx="0">
+            <a:schemeClr val="accent6"/>
+          </a:fillRef>
+          <a:effectRef idx="0">
+            <a:schemeClr val="accent6"/>
+          </a:effectRef>
+          <a:fontRef idx="minor">
+            <a:schemeClr val="tx1"/>
+          </a:fontRef>
+        </p:style>
+      </p:cxnSp>
+      <p:sp>
+        <p:nvSpPr>
+          <p:cNvPr id="18" name="TextBox 17">
+            <a:extLst>
+              <a:ext uri="{FF2B5EF4-FFF2-40B4-BE49-F238E27FC236}">
+                <a16:creationId xmlns:a16="http://schemas.microsoft.com/office/drawing/2014/main" id="{D5080B4A-7804-330F-0D97-E1ECD2A485C3}"/>
+              </a:ext>
+            </a:extLst>
+          </p:cNvPr>
+          <p:cNvSpPr txBox="1"/>
+          <p:nvPr/>
+        </p:nvSpPr>
+        <p:spPr>
+          <a:xfrm>
+            <a:off x="435468" y="3827319"/>
+            <a:ext cx="11460830" cy="923330"/>
+          </a:xfrm>
+          <a:prstGeom prst="rect">
+            <a:avLst/>
+          </a:prstGeom>
+          <a:noFill/>
+        </p:spPr>
+        <p:txBody>
+          <a:bodyPr wrap="none" rtlCol="0">
+            <a:spAutoFit/>
+          </a:bodyPr>
+          <a:lstStyle/>
+          <a:p>
+            <a:r>
+              <a:rPr lang="en-US" dirty="0"/>
+              <a:t>2d solution:</a:t>
+            </a:r>
+            <a:br>
+              <a:rPr lang="en-US" dirty="0"/>
+            </a:br>
+            <a:r>
+              <a:rPr lang="en-US" dirty="0">
+                <a:hlinkClick r:id="rId3"/>
+              </a:rPr>
+              <a:t>https://www.youtube.com/watch?v=w-hjBXzDD2c</a:t>
+            </a:r>
+            <a:br>
+              <a:rPr lang="en-US" dirty="0"/>
+            </a:br>
+            <a:r>
+              <a:rPr lang="en-US" dirty="0"/>
+              <a:t>we know that the angle is 90 degrees, so we can just use </a:t>
+            </a:r>
+            <a:r>
+              <a:rPr lang="en-US" dirty="0" err="1"/>
+              <a:t>asin</a:t>
+            </a:r>
+            <a:r>
+              <a:rPr lang="en-US" dirty="0"/>
+              <a:t>(R (opposite) / S (diagonal)) to get the maximum angle.</a:t>
+            </a:r>
+          </a:p>
+        </p:txBody>
+      </p:sp>
+      <p:cxnSp>
+        <p:nvCxnSpPr>
+          <p:cNvPr id="20" name="Straight Connector 19">
+            <a:extLst>
+              <a:ext uri="{FF2B5EF4-FFF2-40B4-BE49-F238E27FC236}">
+                <a16:creationId xmlns:a16="http://schemas.microsoft.com/office/drawing/2014/main" id="{E3B25ECA-E399-9135-D2FF-83121C065C4C}"/>
+              </a:ext>
+            </a:extLst>
+          </p:cNvPr>
+          <p:cNvCxnSpPr>
+            <a:cxnSpLocks/>
+          </p:cNvCxnSpPr>
+          <p:nvPr/>
+        </p:nvCxnSpPr>
+        <p:spPr>
+          <a:xfrm flipH="1" flipV="1">
+            <a:off x="7946136" y="1988820"/>
+            <a:ext cx="1373355" cy="851777"/>
+          </a:xfrm>
+          <a:prstGeom prst="line">
+            <a:avLst/>
+          </a:prstGeom>
+          <a:ln>
+            <a:solidFill>
+              <a:srgbClr val="92D050"/>
+            </a:solidFill>
+          </a:ln>
+        </p:spPr>
+        <p:style>
+          <a:lnRef idx="2">
+            <a:schemeClr val="accent1"/>
+          </a:lnRef>
+          <a:fillRef idx="0">
+            <a:schemeClr val="accent1"/>
+          </a:fillRef>
+          <a:effectRef idx="1">
+            <a:schemeClr val="accent1"/>
+          </a:effectRef>
+          <a:fontRef idx="minor">
+            <a:schemeClr val="tx1"/>
+          </a:fontRef>
+        </p:style>
+      </p:cxnSp>
+      <p:sp>
+        <p:nvSpPr>
+          <p:cNvPr id="22" name="Rectangle 21">
+            <a:extLst>
+              <a:ext uri="{FF2B5EF4-FFF2-40B4-BE49-F238E27FC236}">
+                <a16:creationId xmlns:a16="http://schemas.microsoft.com/office/drawing/2014/main" id="{0DA0A7B3-6C4D-06DD-BC8D-2526A9B85521}"/>
+              </a:ext>
+            </a:extLst>
+          </p:cNvPr>
+          <p:cNvSpPr/>
+          <p:nvPr/>
+        </p:nvSpPr>
+        <p:spPr>
+          <a:xfrm rot="18176702">
+            <a:off x="8308848" y="2577223"/>
+            <a:ext cx="914400" cy="914400"/>
+          </a:xfrm>
+          <a:prstGeom prst="rect">
+            <a:avLst/>
+          </a:prstGeom>
+          <a:noFill/>
+          <a:ln>
+            <a:solidFill>
+              <a:srgbClr val="92D050"/>
+            </a:solidFill>
+          </a:ln>
+        </p:spPr>
+        <p:style>
+          <a:lnRef idx="2">
+            <a:schemeClr val="accent1">
+              <a:shade val="15000"/>
+            </a:schemeClr>
+          </a:lnRef>
+          <a:fillRef idx="1">
+            <a:schemeClr val="accent1"/>
+          </a:fillRef>
+          <a:effectRef idx="0">
+            <a:schemeClr val="accent1"/>
+          </a:effectRef>
+          <a:fontRef idx="minor">
+            <a:schemeClr val="lt1"/>
+          </a:fontRef>
+        </p:style>
+        <p:txBody>
+          <a:bodyPr rtlCol="0" anchor="ctr"/>
+          <a:lstStyle/>
+          <a:p>
+            <a:pPr algn="ctr"/>
+            <a:endParaRPr lang="en-US"/>
+          </a:p>
+        </p:txBody>
+      </p:sp>
+    </p:spTree>
+    <p:extLst>
+      <p:ext uri="{BB962C8B-B14F-4D97-AF65-F5344CB8AC3E}">
+        <p14:creationId xmlns:p14="http://schemas.microsoft.com/office/powerpoint/2010/main" val="1317859981"/>
+      </p:ext>
+    </p:extLst>
+  </p:cSld>
+  <p:clrMapOvr>
+    <a:masterClrMapping/>
+  </p:clrMapOvr>
+</p:sld>
+</file>
+
+<file path=ppt/slides/slide8.xml><?xml version="1.0" encoding="utf-8"?>
+<p:sld xmlns:a="http://schemas.openxmlformats.org/drawingml/2006/main" xmlns:r="http://schemas.openxmlformats.org/officeDocument/2006/relationships" xmlns:p="http://schemas.openxmlformats.org/presentationml/2006/main">
+  <p:cSld>
+    <p:spTree>
+      <p:nvGrpSpPr>
+        <p:cNvPr id="1" name=""/>
+        <p:cNvGrpSpPr/>
+        <p:nvPr/>
+      </p:nvGrpSpPr>
+      <p:grpSpPr>
+        <a:xfrm>
+          <a:off x="0" y="0"/>
+          <a:ext cx="0" cy="0"/>
+          <a:chOff x="0" y="0"/>
+          <a:chExt cx="0" cy="0"/>
+        </a:xfrm>
+      </p:grpSpPr>
+      <p:sp>
+        <p:nvSpPr>
+          <p:cNvPr id="4" name="Oval 3">
+            <a:extLst>
+              <a:ext uri="{FF2B5EF4-FFF2-40B4-BE49-F238E27FC236}">
+                <a16:creationId xmlns:a16="http://schemas.microsoft.com/office/drawing/2014/main" id="{3F5DAED5-09C4-CCF4-D598-BE4217F15FDB}"/>
+              </a:ext>
+            </a:extLst>
+          </p:cNvPr>
+          <p:cNvSpPr/>
+          <p:nvPr/>
+        </p:nvSpPr>
+        <p:spPr>
+          <a:xfrm>
+            <a:off x="7370618" y="1542473"/>
+            <a:ext cx="3611418" cy="3528291"/>
+          </a:xfrm>
+          <a:prstGeom prst="ellipse">
+            <a:avLst/>
+          </a:prstGeom>
+        </p:spPr>
+        <p:style>
+          <a:lnRef idx="2">
+            <a:schemeClr val="accent1">
+              <a:shade val="15000"/>
+            </a:schemeClr>
+          </a:lnRef>
+          <a:fillRef idx="1">
+            <a:schemeClr val="accent1"/>
+          </a:fillRef>
+          <a:effectRef idx="0">
+            <a:schemeClr val="accent1"/>
+          </a:effectRef>
+          <a:fontRef idx="minor">
+            <a:schemeClr val="lt1"/>
+          </a:fontRef>
+        </p:style>
+        <p:txBody>
+          <a:bodyPr rtlCol="0" anchor="ctr"/>
+          <a:lstStyle/>
+          <a:p>
+            <a:pPr algn="ctr"/>
+            <a:endParaRPr lang="en-US" dirty="0"/>
+          </a:p>
+        </p:txBody>
+      </p:sp>
+      <p:cxnSp>
+        <p:nvCxnSpPr>
+          <p:cNvPr id="5" name="Straight Arrow Connector 4">
+            <a:extLst>
+              <a:ext uri="{FF2B5EF4-FFF2-40B4-BE49-F238E27FC236}">
+                <a16:creationId xmlns:a16="http://schemas.microsoft.com/office/drawing/2014/main" id="{E116C9E4-BF85-9B26-09C3-D821F16D8953}"/>
+              </a:ext>
+            </a:extLst>
+          </p:cNvPr>
+          <p:cNvCxnSpPr>
+            <a:cxnSpLocks/>
+          </p:cNvCxnSpPr>
+          <p:nvPr/>
+        </p:nvCxnSpPr>
+        <p:spPr>
+          <a:xfrm>
+            <a:off x="1846333" y="2840244"/>
+            <a:ext cx="9348140" cy="2230520"/>
+          </a:xfrm>
+          <a:prstGeom prst="straightConnector1">
+            <a:avLst/>
+          </a:prstGeom>
+          <a:ln>
+            <a:solidFill>
+              <a:srgbClr val="FF0000"/>
+            </a:solidFill>
+            <a:tailEnd type="triangle"/>
+          </a:ln>
+        </p:spPr>
+        <p:style>
+          <a:lnRef idx="1">
+            <a:schemeClr val="accent6"/>
+          </a:lnRef>
+          <a:fillRef idx="0">
+            <a:schemeClr val="accent6"/>
+          </a:fillRef>
+          <a:effectRef idx="0">
+            <a:schemeClr val="accent6"/>
+          </a:effectRef>
+          <a:fontRef idx="minor">
+            <a:schemeClr val="tx1"/>
+          </a:fontRef>
+        </p:style>
+      </p:cxnSp>
+      <p:cxnSp>
+        <p:nvCxnSpPr>
+          <p:cNvPr id="13" name="Straight Connector 12">
+            <a:extLst>
+              <a:ext uri="{FF2B5EF4-FFF2-40B4-BE49-F238E27FC236}">
+                <a16:creationId xmlns:a16="http://schemas.microsoft.com/office/drawing/2014/main" id="{0129CBC1-5B45-9F1D-4FCB-CA83FB7EFE4B}"/>
+              </a:ext>
+            </a:extLst>
+          </p:cNvPr>
+          <p:cNvCxnSpPr>
+            <a:stCxn id="4" idx="0"/>
+          </p:cNvCxnSpPr>
+          <p:nvPr/>
+        </p:nvCxnSpPr>
+        <p:spPr>
+          <a:xfrm flipH="1">
+            <a:off x="9162473" y="1542473"/>
+            <a:ext cx="13854" cy="1690254"/>
+          </a:xfrm>
+          <a:prstGeom prst="line">
+            <a:avLst/>
+          </a:prstGeom>
+          <a:ln>
+            <a:solidFill>
+              <a:schemeClr val="bg1"/>
+            </a:solidFill>
+          </a:ln>
+        </p:spPr>
+        <p:style>
+          <a:lnRef idx="2">
+            <a:schemeClr val="accent1"/>
+          </a:lnRef>
+          <a:fillRef idx="0">
+            <a:schemeClr val="accent1"/>
+          </a:fillRef>
+          <a:effectRef idx="1">
+            <a:schemeClr val="accent1"/>
+          </a:effectRef>
+          <a:fontRef idx="minor">
+            <a:schemeClr val="tx1"/>
+          </a:fontRef>
+        </p:style>
+      </p:cxnSp>
+      <p:sp>
+        <p:nvSpPr>
+          <p:cNvPr id="14" name="TextBox 13">
+            <a:extLst>
+              <a:ext uri="{FF2B5EF4-FFF2-40B4-BE49-F238E27FC236}">
+                <a16:creationId xmlns:a16="http://schemas.microsoft.com/office/drawing/2014/main" id="{A22C8E0E-4270-D172-8C35-A2EB84ABD348}"/>
+              </a:ext>
+            </a:extLst>
+          </p:cNvPr>
+          <p:cNvSpPr txBox="1"/>
+          <p:nvPr/>
+        </p:nvSpPr>
+        <p:spPr>
+          <a:xfrm>
+            <a:off x="9291780" y="2350655"/>
+            <a:ext cx="324128" cy="369332"/>
+          </a:xfrm>
+          <a:prstGeom prst="rect">
+            <a:avLst/>
+          </a:prstGeom>
+          <a:noFill/>
+        </p:spPr>
+        <p:txBody>
+          <a:bodyPr wrap="none" rtlCol="0">
+            <a:spAutoFit/>
+          </a:bodyPr>
+          <a:lstStyle/>
+          <a:p>
+            <a:r>
+              <a:rPr lang="en-US" dirty="0"/>
+              <a:t>R</a:t>
+            </a:r>
+          </a:p>
+        </p:txBody>
+      </p:sp>
+      <p:sp>
+        <p:nvSpPr>
+          <p:cNvPr id="15" name="TextBox 14">
+            <a:extLst>
+              <a:ext uri="{FF2B5EF4-FFF2-40B4-BE49-F238E27FC236}">
+                <a16:creationId xmlns:a16="http://schemas.microsoft.com/office/drawing/2014/main" id="{82C7EBAC-75C5-02F6-ECD1-5F925E3EB664}"/>
+              </a:ext>
+            </a:extLst>
+          </p:cNvPr>
+          <p:cNvSpPr txBox="1"/>
+          <p:nvPr/>
+        </p:nvSpPr>
+        <p:spPr>
+          <a:xfrm>
+            <a:off x="1528617" y="2535321"/>
+            <a:ext cx="317716" cy="369332"/>
+          </a:xfrm>
+          <a:prstGeom prst="rect">
+            <a:avLst/>
+          </a:prstGeom>
+          <a:noFill/>
+        </p:spPr>
+        <p:txBody>
+          <a:bodyPr wrap="none" rtlCol="0">
+            <a:spAutoFit/>
+          </a:bodyPr>
+          <a:lstStyle/>
+          <a:p>
+            <a:r>
+              <a:rPr lang="en-US" dirty="0"/>
+              <a:t>P</a:t>
+            </a:r>
+          </a:p>
+        </p:txBody>
+      </p:sp>
+    </p:spTree>
+    <p:extLst>
+      <p:ext uri="{BB962C8B-B14F-4D97-AF65-F5344CB8AC3E}">
+        <p14:creationId xmlns:p14="http://schemas.microsoft.com/office/powerpoint/2010/main" val="1379234439"/>
       </p:ext>
     </p:extLst>
   </p:cSld>
@@ -7124,4 +8264,319 @@
     </a:ext>
   </a:extLst>
 </a:theme>
+</file>
+
+<file path=ppt/theme/theme2.xml><?xml version="1.0" encoding="utf-8"?>
+<a:theme xmlns:a="http://schemas.openxmlformats.org/drawingml/2006/main" name="Office Theme">
+  <a:themeElements>
+    <a:clrScheme name="Office">
+      <a:dk1>
+        <a:sysClr val="windowText" lastClr="000000"/>
+      </a:dk1>
+      <a:lt1>
+        <a:sysClr val="window" lastClr="FFFFFF"/>
+      </a:lt1>
+      <a:dk2>
+        <a:srgbClr val="0E2841"/>
+      </a:dk2>
+      <a:lt2>
+        <a:srgbClr val="E8E8E8"/>
+      </a:lt2>
+      <a:accent1>
+        <a:srgbClr val="156082"/>
+      </a:accent1>
+      <a:accent2>
+        <a:srgbClr val="E97132"/>
+      </a:accent2>
+      <a:accent3>
+        <a:srgbClr val="196B24"/>
+      </a:accent3>
+      <a:accent4>
+        <a:srgbClr val="0F9ED5"/>
+      </a:accent4>
+      <a:accent5>
+        <a:srgbClr val="A02B93"/>
+      </a:accent5>
+      <a:accent6>
+        <a:srgbClr val="4EA72E"/>
+      </a:accent6>
+      <a:hlink>
+        <a:srgbClr val="467886"/>
+      </a:hlink>
+      <a:folHlink>
+        <a:srgbClr val="96607D"/>
+      </a:folHlink>
+    </a:clrScheme>
+    <a:fontScheme name="Office">
+      <a:majorFont>
+        <a:latin typeface="Aptos Display" panose="02110004020202020204"/>
+        <a:ea typeface=""/>
+        <a:cs typeface=""/>
+        <a:font script="Jpan" typeface="游ゴシック Light"/>
+        <a:font script="Hang" typeface="맑은 고딕"/>
+        <a:font script="Hans" typeface="等线 Light"/>
+        <a:font script="Hant" typeface="新細明體"/>
+        <a:font script="Arab" typeface="Times New Roman"/>
+        <a:font script="Hebr" typeface="Times New Roman"/>
+        <a:font script="Thai" typeface="Angsana New"/>
+        <a:font script="Ethi" typeface="Nyala"/>
+        <a:font script="Beng" typeface="Vrinda"/>
+        <a:font script="Gujr" typeface="Shruti"/>
+        <a:font script="Khmr" typeface="MoolBoran"/>
+        <a:font script="Knda" typeface="Tunga"/>
+        <a:font script="Guru" typeface="Raavi"/>
+        <a:font script="Cans" typeface="Euphemia"/>
+        <a:font script="Cher" typeface="Plantagenet Cherokee"/>
+        <a:font script="Yiii" typeface="Microsoft Yi Baiti"/>
+        <a:font script="Tibt" typeface="Microsoft Himalaya"/>
+        <a:font script="Thaa" typeface="MV Boli"/>
+        <a:font script="Deva" typeface="Mangal"/>
+        <a:font script="Telu" typeface="Gautami"/>
+        <a:font script="Taml" typeface="Latha"/>
+        <a:font script="Syrc" typeface="Estrangelo Edessa"/>
+        <a:font script="Orya" typeface="Kalinga"/>
+        <a:font script="Mlym" typeface="Kartika"/>
+        <a:font script="Laoo" typeface="DokChampa"/>
+        <a:font script="Sinh" typeface="Iskoola Pota"/>
+        <a:font script="Mong" typeface="Mongolian Baiti"/>
+        <a:font script="Viet" typeface="Times New Roman"/>
+        <a:font script="Uigh" typeface="Microsoft Uighur"/>
+        <a:font script="Geor" typeface="Sylfaen"/>
+        <a:font script="Armn" typeface="Arial"/>
+        <a:font script="Bugi" typeface="Leelawadee UI"/>
+        <a:font script="Bopo" typeface="Microsoft JhengHei"/>
+        <a:font script="Java" typeface="Javanese Text"/>
+        <a:font script="Lisu" typeface="Segoe UI"/>
+        <a:font script="Mymr" typeface="Myanmar Text"/>
+        <a:font script="Nkoo" typeface="Ebrima"/>
+        <a:font script="Olck" typeface="Nirmala UI"/>
+        <a:font script="Osma" typeface="Ebrima"/>
+        <a:font script="Phag" typeface="Phagspa"/>
+        <a:font script="Syrn" typeface="Estrangelo Edessa"/>
+        <a:font script="Syrj" typeface="Estrangelo Edessa"/>
+        <a:font script="Syre" typeface="Estrangelo Edessa"/>
+        <a:font script="Sora" typeface="Nirmala UI"/>
+        <a:font script="Tale" typeface="Microsoft Tai Le"/>
+        <a:font script="Talu" typeface="Microsoft New Tai Lue"/>
+        <a:font script="Tfng" typeface="Ebrima"/>
+      </a:majorFont>
+      <a:minorFont>
+        <a:latin typeface="Aptos" panose="02110004020202020204"/>
+        <a:ea typeface=""/>
+        <a:cs typeface=""/>
+        <a:font script="Jpan" typeface="游ゴシック"/>
+        <a:font script="Hang" typeface="맑은 고딕"/>
+        <a:font script="Hans" typeface="等线"/>
+        <a:font script="Hant" typeface="新細明體"/>
+        <a:font script="Arab" typeface="Arial"/>
+        <a:font script="Hebr" typeface="Arial"/>
+        <a:font script="Thai" typeface="Cordia New"/>
+        <a:font script="Ethi" typeface="Nyala"/>
+        <a:font script="Beng" typeface="Vrinda"/>
+        <a:font script="Gujr" typeface="Shruti"/>
+        <a:font script="Khmr" typeface="DaunPenh"/>
+        <a:font script="Knda" typeface="Tunga"/>
+        <a:font script="Guru" typeface="Raavi"/>
+        <a:font script="Cans" typeface="Euphemia"/>
+        <a:font script="Cher" typeface="Plantagenet Cherokee"/>
+        <a:font script="Yiii" typeface="Microsoft Yi Baiti"/>
+        <a:font script="Tibt" typeface="Microsoft Himalaya"/>
+        <a:font script="Thaa" typeface="MV Boli"/>
+        <a:font script="Deva" typeface="Mangal"/>
+        <a:font script="Telu" typeface="Gautami"/>
+        <a:font script="Taml" typeface="Latha"/>
+        <a:font script="Syrc" typeface="Estrangelo Edessa"/>
+        <a:font script="Orya" typeface="Kalinga"/>
+        <a:font script="Mlym" typeface="Kartika"/>
+        <a:font script="Laoo" typeface="DokChampa"/>
+        <a:font script="Sinh" typeface="Iskoola Pota"/>
+        <a:font script="Mong" typeface="Mongolian Baiti"/>
+        <a:font script="Viet" typeface="Arial"/>
+        <a:font script="Uigh" typeface="Microsoft Uighur"/>
+        <a:font script="Geor" typeface="Sylfaen"/>
+        <a:font script="Armn" typeface="Arial"/>
+        <a:font script="Bugi" typeface="Leelawadee UI"/>
+        <a:font script="Bopo" typeface="Microsoft JhengHei"/>
+        <a:font script="Java" typeface="Javanese Text"/>
+        <a:font script="Lisu" typeface="Segoe UI"/>
+        <a:font script="Mymr" typeface="Myanmar Text"/>
+        <a:font script="Nkoo" typeface="Ebrima"/>
+        <a:font script="Olck" typeface="Nirmala UI"/>
+        <a:font script="Osma" typeface="Ebrima"/>
+        <a:font script="Phag" typeface="Phagspa"/>
+        <a:font script="Syrn" typeface="Estrangelo Edessa"/>
+        <a:font script="Syrj" typeface="Estrangelo Edessa"/>
+        <a:font script="Syre" typeface="Estrangelo Edessa"/>
+        <a:font script="Sora" typeface="Nirmala UI"/>
+        <a:font script="Tale" typeface="Microsoft Tai Le"/>
+        <a:font script="Talu" typeface="Microsoft New Tai Lue"/>
+        <a:font script="Tfng" typeface="Ebrima"/>
+      </a:minorFont>
+    </a:fontScheme>
+    <a:fmtScheme name="Office">
+      <a:fillStyleLst>
+        <a:solidFill>
+          <a:schemeClr val="phClr"/>
+        </a:solidFill>
+        <a:gradFill rotWithShape="1">
+          <a:gsLst>
+            <a:gs pos="0">
+              <a:schemeClr val="phClr">
+                <a:lumMod val="110000"/>
+                <a:satMod val="105000"/>
+                <a:tint val="67000"/>
+              </a:schemeClr>
+            </a:gs>
+            <a:gs pos="50000">
+              <a:schemeClr val="phClr">
+                <a:lumMod val="105000"/>
+                <a:satMod val="103000"/>
+                <a:tint val="73000"/>
+              </a:schemeClr>
+            </a:gs>
+            <a:gs pos="100000">
+              <a:schemeClr val="phClr">
+                <a:lumMod val="105000"/>
+                <a:satMod val="109000"/>
+                <a:tint val="81000"/>
+              </a:schemeClr>
+            </a:gs>
+          </a:gsLst>
+          <a:lin ang="5400000" scaled="0"/>
+        </a:gradFill>
+        <a:gradFill rotWithShape="1">
+          <a:gsLst>
+            <a:gs pos="0">
+              <a:schemeClr val="phClr">
+                <a:satMod val="103000"/>
+                <a:lumMod val="102000"/>
+                <a:tint val="94000"/>
+              </a:schemeClr>
+            </a:gs>
+            <a:gs pos="50000">
+              <a:schemeClr val="phClr">
+                <a:satMod val="110000"/>
+                <a:lumMod val="100000"/>
+                <a:shade val="100000"/>
+              </a:schemeClr>
+            </a:gs>
+            <a:gs pos="100000">
+              <a:schemeClr val="phClr">
+                <a:lumMod val="99000"/>
+                <a:satMod val="120000"/>
+                <a:shade val="78000"/>
+              </a:schemeClr>
+            </a:gs>
+          </a:gsLst>
+          <a:lin ang="5400000" scaled="0"/>
+        </a:gradFill>
+      </a:fillStyleLst>
+      <a:lnStyleLst>
+        <a:ln w="12700" cap="flat" cmpd="sng" algn="ctr">
+          <a:solidFill>
+            <a:schemeClr val="phClr"/>
+          </a:solidFill>
+          <a:prstDash val="solid"/>
+          <a:miter lim="800000"/>
+        </a:ln>
+        <a:ln w="19050" cap="flat" cmpd="sng" algn="ctr">
+          <a:solidFill>
+            <a:schemeClr val="phClr"/>
+          </a:solidFill>
+          <a:prstDash val="solid"/>
+          <a:miter lim="800000"/>
+        </a:ln>
+        <a:ln w="25400" cap="flat" cmpd="sng" algn="ctr">
+          <a:solidFill>
+            <a:schemeClr val="phClr"/>
+          </a:solidFill>
+          <a:prstDash val="solid"/>
+          <a:miter lim="800000"/>
+        </a:ln>
+      </a:lnStyleLst>
+      <a:effectStyleLst>
+        <a:effectStyle>
+          <a:effectLst/>
+        </a:effectStyle>
+        <a:effectStyle>
+          <a:effectLst/>
+        </a:effectStyle>
+        <a:effectStyle>
+          <a:effectLst>
+            <a:outerShdw blurRad="57150" dist="19050" dir="5400000" algn="ctr" rotWithShape="0">
+              <a:srgbClr val="000000">
+                <a:alpha val="63000"/>
+              </a:srgbClr>
+            </a:outerShdw>
+          </a:effectLst>
+        </a:effectStyle>
+      </a:effectStyleLst>
+      <a:bgFillStyleLst>
+        <a:solidFill>
+          <a:schemeClr val="phClr"/>
+        </a:solidFill>
+        <a:solidFill>
+          <a:schemeClr val="phClr">
+            <a:tint val="95000"/>
+            <a:satMod val="170000"/>
+          </a:schemeClr>
+        </a:solidFill>
+        <a:gradFill rotWithShape="1">
+          <a:gsLst>
+            <a:gs pos="0">
+              <a:schemeClr val="phClr">
+                <a:tint val="93000"/>
+                <a:satMod val="150000"/>
+                <a:shade val="98000"/>
+                <a:lumMod val="102000"/>
+              </a:schemeClr>
+            </a:gs>
+            <a:gs pos="50000">
+              <a:schemeClr val="phClr">
+                <a:tint val="98000"/>
+                <a:satMod val="130000"/>
+                <a:shade val="90000"/>
+                <a:lumMod val="103000"/>
+              </a:schemeClr>
+            </a:gs>
+            <a:gs pos="100000">
+              <a:schemeClr val="phClr">
+                <a:shade val="63000"/>
+                <a:satMod val="120000"/>
+              </a:schemeClr>
+            </a:gs>
+          </a:gsLst>
+          <a:lin ang="5400000" scaled="0"/>
+        </a:gradFill>
+      </a:bgFillStyleLst>
+    </a:fmtScheme>
+  </a:themeElements>
+  <a:objectDefaults>
+    <a:lnDef>
+      <a:spPr/>
+      <a:bodyPr/>
+      <a:lstStyle/>
+      <a:style>
+        <a:lnRef idx="2">
+          <a:schemeClr val="accent1"/>
+        </a:lnRef>
+        <a:fillRef idx="0">
+          <a:schemeClr val="accent1"/>
+        </a:fillRef>
+        <a:effectRef idx="1">
+          <a:schemeClr val="accent1"/>
+        </a:effectRef>
+        <a:fontRef idx="minor">
+          <a:schemeClr val="tx1"/>
+        </a:fontRef>
+      </a:style>
+    </a:lnDef>
+  </a:objectDefaults>
+  <a:extraClrSchemeLst/>
+  <a:extLst>
+    <a:ext uri="{05A4C25C-085E-4340-85A3-A5531E510DB2}">
+      <thm15:themeFamily xmlns:thm15="http://schemas.microsoft.com/office/thememl/2012/main" name="Office Theme" id="{2E142A2C-CD16-42D6-873A-C26D2A0506FA}" vid="{1BDDFF52-6CD6-40A5-AB3C-68EB2F1E4D0A}"/>
+    </a:ext>
+  </a:extLst>
+</a:theme>
 </file>
</xml_diff>

<commit_message>
removed stuff from other repo
</commit_message>
<xml_diff>
--- a/docs/documentation.pptx
+++ b/docs/documentation.pptx
@@ -5,7 +5,7 @@
     <p:sldMasterId id="2147483648" r:id="rId1"/>
   </p:sldMasterIdLst>
   <p:notesMasterIdLst>
-    <p:notesMasterId r:id="rId10"/>
+    <p:notesMasterId r:id="rId11"/>
   </p:notesMasterIdLst>
   <p:sldIdLst>
     <p:sldId id="256" r:id="rId2"/>
@@ -16,6 +16,7 @@
     <p:sldId id="261" r:id="rId7"/>
     <p:sldId id="262" r:id="rId8"/>
     <p:sldId id="263" r:id="rId9"/>
+    <p:sldId id="264" r:id="rId10"/>
   </p:sldIdLst>
   <p:sldSz cx="12192000" cy="6858000"/>
   <p:notesSz cx="6858000" cy="9144000"/>
@@ -131,6 +132,7 @@
           <p14:sldIdLst>
             <p14:sldId id="262"/>
             <p14:sldId id="263"/>
+            <p14:sldId id="264"/>
           </p14:sldIdLst>
         </p14:section>
       </p14:sectionLst>
@@ -224,7 +226,7 @@
           <a:p>
             <a:fld id="{CCF00BB7-ABBE-422D-B859-7545CEDE1AD1}" type="datetimeFigureOut">
               <a:rPr lang="en-US" smtClean="0"/>
-              <a:t>6/15/2025</a:t>
+              <a:t>6/27/2025</a:t>
             </a:fld>
             <a:endParaRPr lang="en-US"/>
           </a:p>
@@ -722,7 +724,7 @@
           <a:p>
             <a:fld id="{C3B77EC8-255C-4E73-BE92-D907A410F579}" type="datetimeFigureOut">
               <a:rPr lang="en-US" smtClean="0"/>
-              <a:t>6/15/2025</a:t>
+              <a:t>6/27/2025</a:t>
             </a:fld>
             <a:endParaRPr lang="en-US"/>
           </a:p>
@@ -920,7 +922,7 @@
           <a:p>
             <a:fld id="{C3B77EC8-255C-4E73-BE92-D907A410F579}" type="datetimeFigureOut">
               <a:rPr lang="en-US" smtClean="0"/>
-              <a:t>6/15/2025</a:t>
+              <a:t>6/27/2025</a:t>
             </a:fld>
             <a:endParaRPr lang="en-US"/>
           </a:p>
@@ -1128,7 +1130,7 @@
           <a:p>
             <a:fld id="{C3B77EC8-255C-4E73-BE92-D907A410F579}" type="datetimeFigureOut">
               <a:rPr lang="en-US" smtClean="0"/>
-              <a:t>6/15/2025</a:t>
+              <a:t>6/27/2025</a:t>
             </a:fld>
             <a:endParaRPr lang="en-US"/>
           </a:p>
@@ -1326,7 +1328,7 @@
           <a:p>
             <a:fld id="{C3B77EC8-255C-4E73-BE92-D907A410F579}" type="datetimeFigureOut">
               <a:rPr lang="en-US" smtClean="0"/>
-              <a:t>6/15/2025</a:t>
+              <a:t>6/27/2025</a:t>
             </a:fld>
             <a:endParaRPr lang="en-US"/>
           </a:p>
@@ -1601,7 +1603,7 @@
           <a:p>
             <a:fld id="{C3B77EC8-255C-4E73-BE92-D907A410F579}" type="datetimeFigureOut">
               <a:rPr lang="en-US" smtClean="0"/>
-              <a:t>6/15/2025</a:t>
+              <a:t>6/27/2025</a:t>
             </a:fld>
             <a:endParaRPr lang="en-US"/>
           </a:p>
@@ -1866,7 +1868,7 @@
           <a:p>
             <a:fld id="{C3B77EC8-255C-4E73-BE92-D907A410F579}" type="datetimeFigureOut">
               <a:rPr lang="en-US" smtClean="0"/>
-              <a:t>6/15/2025</a:t>
+              <a:t>6/27/2025</a:t>
             </a:fld>
             <a:endParaRPr lang="en-US"/>
           </a:p>
@@ -2278,7 +2280,7 @@
           <a:p>
             <a:fld id="{C3B77EC8-255C-4E73-BE92-D907A410F579}" type="datetimeFigureOut">
               <a:rPr lang="en-US" smtClean="0"/>
-              <a:t>6/15/2025</a:t>
+              <a:t>6/27/2025</a:t>
             </a:fld>
             <a:endParaRPr lang="en-US"/>
           </a:p>
@@ -2419,7 +2421,7 @@
           <a:p>
             <a:fld id="{C3B77EC8-255C-4E73-BE92-D907A410F579}" type="datetimeFigureOut">
               <a:rPr lang="en-US" smtClean="0"/>
-              <a:t>6/15/2025</a:t>
+              <a:t>6/27/2025</a:t>
             </a:fld>
             <a:endParaRPr lang="en-US"/>
           </a:p>
@@ -2532,7 +2534,7 @@
           <a:p>
             <a:fld id="{C3B77EC8-255C-4E73-BE92-D907A410F579}" type="datetimeFigureOut">
               <a:rPr lang="en-US" smtClean="0"/>
-              <a:t>6/15/2025</a:t>
+              <a:t>6/27/2025</a:t>
             </a:fld>
             <a:endParaRPr lang="en-US"/>
           </a:p>
@@ -2843,7 +2845,7 @@
           <a:p>
             <a:fld id="{C3B77EC8-255C-4E73-BE92-D907A410F579}" type="datetimeFigureOut">
               <a:rPr lang="en-US" smtClean="0"/>
-              <a:t>6/15/2025</a:t>
+              <a:t>6/27/2025</a:t>
             </a:fld>
             <a:endParaRPr lang="en-US"/>
           </a:p>
@@ -3131,7 +3133,7 @@
           <a:p>
             <a:fld id="{C3B77EC8-255C-4E73-BE92-D907A410F579}" type="datetimeFigureOut">
               <a:rPr lang="en-US" smtClean="0"/>
-              <a:t>6/15/2025</a:t>
+              <a:t>6/27/2025</a:t>
             </a:fld>
             <a:endParaRPr lang="en-US"/>
           </a:p>
@@ -3372,7 +3374,7 @@
           <a:p>
             <a:fld id="{C3B77EC8-255C-4E73-BE92-D907A410F579}" type="datetimeFigureOut">
               <a:rPr lang="en-US" smtClean="0"/>
-              <a:t>6/15/2025</a:t>
+              <a:t>6/27/2025</a:t>
             </a:fld>
             <a:endParaRPr lang="en-US"/>
           </a:p>
@@ -7749,7 +7751,7 @@
         </p:nvSpPr>
         <p:spPr>
           <a:xfrm>
-            <a:off x="7370618" y="1542473"/>
+            <a:off x="7201869" y="189161"/>
             <a:ext cx="3611418" cy="3528291"/>
           </a:xfrm>
           <a:prstGeom prst="ellipse">
@@ -7797,15 +7799,15 @@
         </p:nvCxnSpPr>
         <p:spPr>
           <a:xfrm>
-            <a:off x="1846333" y="2840244"/>
-            <a:ext cx="9348140" cy="2230520"/>
+            <a:off x="2039112" y="2535321"/>
+            <a:ext cx="6739128" cy="1182131"/>
           </a:xfrm>
           <a:prstGeom prst="straightConnector1">
             <a:avLst/>
           </a:prstGeom>
           <a:ln>
             <a:solidFill>
-              <a:srgbClr val="FF0000"/>
+              <a:schemeClr val="tx1"/>
             </a:solidFill>
             <a:tailEnd type="triangle"/>
           </a:ln>
@@ -7841,7 +7843,7 @@
         </p:nvCxnSpPr>
         <p:spPr>
           <a:xfrm flipH="1">
-            <a:off x="9162473" y="1542473"/>
+            <a:off x="8993724" y="189161"/>
             <a:ext cx="13854" cy="1690254"/>
           </a:xfrm>
           <a:prstGeom prst="line">
@@ -7938,10 +7940,1186 @@
           </a:p>
         </p:txBody>
       </p:sp>
+      <p:cxnSp>
+        <p:nvCxnSpPr>
+          <p:cNvPr id="6" name="Straight Arrow Connector 5">
+            <a:extLst>
+              <a:ext uri="{FF2B5EF4-FFF2-40B4-BE49-F238E27FC236}">
+                <a16:creationId xmlns:a16="http://schemas.microsoft.com/office/drawing/2014/main" id="{CE8C9FBF-5689-4DA2-0D19-0264039F270A}"/>
+              </a:ext>
+            </a:extLst>
+          </p:cNvPr>
+          <p:cNvCxnSpPr>
+            <a:cxnSpLocks/>
+          </p:cNvCxnSpPr>
+          <p:nvPr/>
+        </p:nvCxnSpPr>
+        <p:spPr>
+          <a:xfrm flipV="1">
+            <a:off x="2039112" y="374904"/>
+            <a:ext cx="6181344" cy="2160417"/>
+          </a:xfrm>
+          <a:prstGeom prst="straightConnector1">
+            <a:avLst/>
+          </a:prstGeom>
+          <a:ln>
+            <a:solidFill>
+              <a:schemeClr val="tx1"/>
+            </a:solidFill>
+            <a:tailEnd type="triangle"/>
+          </a:ln>
+        </p:spPr>
+        <p:style>
+          <a:lnRef idx="1">
+            <a:schemeClr val="accent6"/>
+          </a:lnRef>
+          <a:fillRef idx="0">
+            <a:schemeClr val="accent6"/>
+          </a:fillRef>
+          <a:effectRef idx="0">
+            <a:schemeClr val="accent6"/>
+          </a:effectRef>
+          <a:fontRef idx="minor">
+            <a:schemeClr val="tx1"/>
+          </a:fontRef>
+        </p:style>
+      </p:cxnSp>
     </p:spTree>
     <p:extLst>
       <p:ext uri="{BB962C8B-B14F-4D97-AF65-F5344CB8AC3E}">
         <p14:creationId xmlns:p14="http://schemas.microsoft.com/office/powerpoint/2010/main" val="1379234439"/>
+      </p:ext>
+    </p:extLst>
+  </p:cSld>
+  <p:clrMapOvr>
+    <a:masterClrMapping/>
+  </p:clrMapOvr>
+</p:sld>
+</file>
+
+<file path=ppt/slides/slide9.xml><?xml version="1.0" encoding="utf-8"?>
+<p:sld xmlns:a="http://schemas.openxmlformats.org/drawingml/2006/main" xmlns:r="http://schemas.openxmlformats.org/officeDocument/2006/relationships" xmlns:p="http://schemas.openxmlformats.org/presentationml/2006/main">
+  <p:cSld>
+    <p:spTree>
+      <p:nvGrpSpPr>
+        <p:cNvPr id="1" name=""/>
+        <p:cNvGrpSpPr/>
+        <p:nvPr/>
+      </p:nvGrpSpPr>
+      <p:grpSpPr>
+        <a:xfrm>
+          <a:off x="0" y="0"/>
+          <a:ext cx="0" cy="0"/>
+          <a:chOff x="0" y="0"/>
+          <a:chExt cx="0" cy="0"/>
+        </a:xfrm>
+      </p:grpSpPr>
+      <p:sp>
+        <p:nvSpPr>
+          <p:cNvPr id="2" name="TextBox 1">
+            <a:extLst>
+              <a:ext uri="{FF2B5EF4-FFF2-40B4-BE49-F238E27FC236}">
+                <a16:creationId xmlns:a16="http://schemas.microsoft.com/office/drawing/2014/main" id="{D4FEDD0F-722A-FCFA-4D51-EEAFB7D11D6D}"/>
+              </a:ext>
+            </a:extLst>
+          </p:cNvPr>
+          <p:cNvSpPr txBox="1"/>
+          <p:nvPr/>
+        </p:nvSpPr>
+        <p:spPr>
+          <a:xfrm>
+            <a:off x="89916" y="149947"/>
+            <a:ext cx="6345174" cy="4801314"/>
+          </a:xfrm>
+          <a:prstGeom prst="rect">
+            <a:avLst/>
+          </a:prstGeom>
+          <a:noFill/>
+        </p:spPr>
+        <p:txBody>
+          <a:bodyPr wrap="square" rtlCol="0">
+            <a:spAutoFit/>
+          </a:bodyPr>
+          <a:lstStyle/>
+          <a:p>
+            <a:r>
+              <a:rPr lang="en-US" dirty="0"/>
+              <a:t>Check if a brush is </a:t>
+            </a:r>
+            <a:r>
+              <a:rPr lang="en-US" dirty="0" err="1"/>
+              <a:t>iteratable</a:t>
+            </a:r>
+            <a:r>
+              <a:rPr lang="en-US" dirty="0"/>
+              <a:t>.</a:t>
+            </a:r>
+          </a:p>
+          <a:p>
+            <a:r>
+              <a:rPr lang="en-US" dirty="0"/>
+              <a:t>When operator* isn’t implemented, use </a:t>
+            </a:r>
+            <a:r>
+              <a:rPr lang="en-US" dirty="0" err="1"/>
+              <a:t>getValue</a:t>
+            </a:r>
+            <a:r>
+              <a:rPr lang="en-US" dirty="0"/>
+              <a:t>(position).</a:t>
+            </a:r>
+            <a:br>
+              <a:rPr lang="en-US" dirty="0"/>
+            </a:br>
+            <a:r>
+              <a:rPr lang="en-US" dirty="0" err="1"/>
+              <a:t>Iteratable</a:t>
+            </a:r>
+            <a:r>
+              <a:rPr lang="en-US" dirty="0"/>
+              <a:t> brushes have a </a:t>
+            </a:r>
+            <a:r>
+              <a:rPr lang="en-US" dirty="0" err="1"/>
+              <a:t>setPosition</a:t>
+            </a:r>
+            <a:r>
+              <a:rPr lang="en-US" dirty="0"/>
+              <a:t>(pos) function, an operator++ and an operator*.</a:t>
+            </a:r>
+            <a:br>
+              <a:rPr lang="en-US" dirty="0"/>
+            </a:br>
+            <a:r>
+              <a:rPr lang="en-US" dirty="0"/>
+              <a:t>When they don’t need a position, </a:t>
+            </a:r>
+            <a:r>
+              <a:rPr lang="en-US" dirty="0" err="1"/>
+              <a:t>setPosition</a:t>
+            </a:r>
+            <a:r>
+              <a:rPr lang="en-US" dirty="0"/>
+              <a:t> is not called.</a:t>
+            </a:r>
+          </a:p>
+          <a:p>
+            <a:r>
+              <a:rPr lang="en-US" dirty="0"/>
+              <a:t>We have one universal function for filling a row.</a:t>
+            </a:r>
+          </a:p>
+          <a:p>
+            <a:r>
+              <a:rPr lang="en-US" dirty="0"/>
+              <a:t>A brush doesn’t modify itself. Brushes are not virtual. Brushes are as efficient as possible.</a:t>
+            </a:r>
+            <a:br>
+              <a:rPr lang="en-US" dirty="0"/>
+            </a:br>
+            <a:r>
+              <a:rPr lang="en-US" dirty="0"/>
+              <a:t>we define an operator++, operator*, </a:t>
+            </a:r>
+            <a:r>
+              <a:rPr lang="en-US" dirty="0" err="1"/>
+              <a:t>setPosition</a:t>
+            </a:r>
+            <a:r>
+              <a:rPr lang="en-US" dirty="0"/>
+              <a:t> and </a:t>
+            </a:r>
+            <a:r>
+              <a:rPr lang="en-US" dirty="0" err="1"/>
+              <a:t>getValue</a:t>
+            </a:r>
+            <a:r>
+              <a:rPr lang="en-US" dirty="0"/>
+              <a:t> function</a:t>
+            </a:r>
+          </a:p>
+          <a:p>
+            <a:r>
+              <a:rPr lang="en-US" dirty="0"/>
+              <a:t>for each class that doesn’t define it themselves.</a:t>
+            </a:r>
+          </a:p>
+          <a:p>
+            <a:r>
+              <a:rPr lang="en-US" dirty="0" err="1"/>
+              <a:t>setPosition</a:t>
+            </a:r>
+            <a:r>
+              <a:rPr lang="en-US" dirty="0"/>
+              <a:t> and operator++ will be defined in the </a:t>
+            </a:r>
+            <a:r>
+              <a:rPr lang="en-US" dirty="0" err="1"/>
+              <a:t>baseclass</a:t>
+            </a:r>
+            <a:r>
+              <a:rPr lang="en-US" dirty="0"/>
+              <a:t>, as it doesn’t require knowledge of the derived type.</a:t>
+            </a:r>
+          </a:p>
+          <a:p>
+            <a:r>
+              <a:rPr lang="en-US" dirty="0" err="1"/>
+              <a:t>getValue</a:t>
+            </a:r>
+            <a:r>
+              <a:rPr lang="en-US" dirty="0"/>
+              <a:t> however, should return the most derived operator *.</a:t>
+            </a:r>
+          </a:p>
+          <a:p>
+            <a:r>
+              <a:rPr lang="en-US" dirty="0"/>
+              <a:t>Therefore, it is a templated function and accepts a this argument.</a:t>
+            </a:r>
+          </a:p>
+          <a:p>
+            <a:r>
+              <a:rPr lang="en-US" dirty="0"/>
+              <a:t>Same with operator*.</a:t>
+            </a:r>
+          </a:p>
+        </p:txBody>
+      </p:sp>
+      <p:sp>
+        <p:nvSpPr>
+          <p:cNvPr id="3" name="Rectangle 2">
+            <a:extLst>
+              <a:ext uri="{FF2B5EF4-FFF2-40B4-BE49-F238E27FC236}">
+                <a16:creationId xmlns:a16="http://schemas.microsoft.com/office/drawing/2014/main" id="{113E697F-878C-2807-6C4B-BB837D04A8B8}"/>
+              </a:ext>
+            </a:extLst>
+          </p:cNvPr>
+          <p:cNvSpPr/>
+          <p:nvPr/>
+        </p:nvSpPr>
+        <p:spPr>
+          <a:xfrm>
+            <a:off x="6912864" y="539496"/>
+            <a:ext cx="1143000" cy="438912"/>
+          </a:xfrm>
+          <a:prstGeom prst="rect">
+            <a:avLst/>
+          </a:prstGeom>
+        </p:spPr>
+        <p:style>
+          <a:lnRef idx="2">
+            <a:schemeClr val="accent1">
+              <a:shade val="15000"/>
+            </a:schemeClr>
+          </a:lnRef>
+          <a:fillRef idx="1">
+            <a:schemeClr val="accent1"/>
+          </a:fillRef>
+          <a:effectRef idx="0">
+            <a:schemeClr val="accent1"/>
+          </a:effectRef>
+          <a:fontRef idx="minor">
+            <a:schemeClr val="lt1"/>
+          </a:fontRef>
+        </p:style>
+        <p:txBody>
+          <a:bodyPr rtlCol="0" anchor="ctr"/>
+          <a:lstStyle/>
+          <a:p>
+            <a:pPr algn="ctr"/>
+            <a:r>
+              <a:rPr lang="en-US" dirty="0"/>
+              <a:t>brush</a:t>
+            </a:r>
+          </a:p>
+        </p:txBody>
+      </p:sp>
+      <p:sp>
+        <p:nvSpPr>
+          <p:cNvPr id="4" name="Rectangle 3">
+            <a:extLst>
+              <a:ext uri="{FF2B5EF4-FFF2-40B4-BE49-F238E27FC236}">
+                <a16:creationId xmlns:a16="http://schemas.microsoft.com/office/drawing/2014/main" id="{655365B7-3F93-6F47-BF0F-1DCDF1984AB6}"/>
+              </a:ext>
+            </a:extLst>
+          </p:cNvPr>
+          <p:cNvSpPr/>
+          <p:nvPr/>
+        </p:nvSpPr>
+        <p:spPr>
+          <a:xfrm>
+            <a:off x="7484364" y="1060704"/>
+            <a:ext cx="1143000" cy="438912"/>
+          </a:xfrm>
+          <a:prstGeom prst="rect">
+            <a:avLst/>
+          </a:prstGeom>
+        </p:spPr>
+        <p:style>
+          <a:lnRef idx="2">
+            <a:schemeClr val="accent1">
+              <a:shade val="15000"/>
+            </a:schemeClr>
+          </a:lnRef>
+          <a:fillRef idx="1">
+            <a:schemeClr val="accent1"/>
+          </a:fillRef>
+          <a:effectRef idx="0">
+            <a:schemeClr val="accent1"/>
+          </a:effectRef>
+          <a:fontRef idx="minor">
+            <a:schemeClr val="lt1"/>
+          </a:fontRef>
+        </p:style>
+        <p:txBody>
+          <a:bodyPr rtlCol="0" anchor="ctr"/>
+          <a:lstStyle/>
+          <a:p>
+            <a:pPr algn="ctr"/>
+            <a:r>
+              <a:rPr lang="en-US" dirty="0"/>
+              <a:t>position</a:t>
+            </a:r>
+          </a:p>
+        </p:txBody>
+      </p:sp>
+      <p:sp>
+        <p:nvSpPr>
+          <p:cNvPr id="5" name="Rectangle 4">
+            <a:extLst>
+              <a:ext uri="{FF2B5EF4-FFF2-40B4-BE49-F238E27FC236}">
+                <a16:creationId xmlns:a16="http://schemas.microsoft.com/office/drawing/2014/main" id="{1D7DD5EC-5046-6A4C-3114-5581CEFB32F4}"/>
+              </a:ext>
+            </a:extLst>
+          </p:cNvPr>
+          <p:cNvSpPr/>
+          <p:nvPr/>
+        </p:nvSpPr>
+        <p:spPr>
+          <a:xfrm>
+            <a:off x="7484364" y="2591752"/>
+            <a:ext cx="1143000" cy="438912"/>
+          </a:xfrm>
+          <a:prstGeom prst="rect">
+            <a:avLst/>
+          </a:prstGeom>
+          <a:solidFill>
+            <a:schemeClr val="accent2"/>
+          </a:solidFill>
+          <a:ln>
+            <a:noFill/>
+          </a:ln>
+        </p:spPr>
+        <p:style>
+          <a:lnRef idx="2">
+            <a:schemeClr val="accent1">
+              <a:shade val="15000"/>
+            </a:schemeClr>
+          </a:lnRef>
+          <a:fillRef idx="1">
+            <a:schemeClr val="accent1"/>
+          </a:fillRef>
+          <a:effectRef idx="0">
+            <a:schemeClr val="accent1"/>
+          </a:effectRef>
+          <a:fontRef idx="minor">
+            <a:schemeClr val="lt1"/>
+          </a:fontRef>
+        </p:style>
+        <p:txBody>
+          <a:bodyPr rtlCol="0" anchor="ctr"/>
+          <a:lstStyle/>
+          <a:p>
+            <a:pPr algn="ctr"/>
+            <a:r>
+              <a:rPr lang="en-US" dirty="0"/>
+              <a:t>++</a:t>
+            </a:r>
+          </a:p>
+        </p:txBody>
+      </p:sp>
+      <p:sp>
+        <p:nvSpPr>
+          <p:cNvPr id="6" name="Rectangle 5">
+            <a:extLst>
+              <a:ext uri="{FF2B5EF4-FFF2-40B4-BE49-F238E27FC236}">
+                <a16:creationId xmlns:a16="http://schemas.microsoft.com/office/drawing/2014/main" id="{BCB245EA-49A7-8D1B-77FD-4D241AB81509}"/>
+              </a:ext>
+            </a:extLst>
+          </p:cNvPr>
+          <p:cNvSpPr/>
+          <p:nvPr/>
+        </p:nvSpPr>
+        <p:spPr>
+          <a:xfrm>
+            <a:off x="7484364" y="3162680"/>
+            <a:ext cx="1143000" cy="438912"/>
+          </a:xfrm>
+          <a:prstGeom prst="rect">
+            <a:avLst/>
+          </a:prstGeom>
+          <a:solidFill>
+            <a:schemeClr val="accent2"/>
+          </a:solidFill>
+          <a:ln>
+            <a:noFill/>
+          </a:ln>
+        </p:spPr>
+        <p:style>
+          <a:lnRef idx="2">
+            <a:schemeClr val="accent1">
+              <a:shade val="15000"/>
+            </a:schemeClr>
+          </a:lnRef>
+          <a:fillRef idx="1">
+            <a:schemeClr val="accent1"/>
+          </a:fillRef>
+          <a:effectRef idx="0">
+            <a:schemeClr val="accent1"/>
+          </a:effectRef>
+          <a:fontRef idx="minor">
+            <a:schemeClr val="lt1"/>
+          </a:fontRef>
+        </p:style>
+        <p:txBody>
+          <a:bodyPr rtlCol="0" anchor="ctr"/>
+          <a:lstStyle/>
+          <a:p>
+            <a:pPr algn="ctr"/>
+            <a:r>
+              <a:rPr lang="en-US" dirty="0"/>
+              <a:t>*</a:t>
+            </a:r>
+          </a:p>
+        </p:txBody>
+      </p:sp>
+      <p:sp>
+        <p:nvSpPr>
+          <p:cNvPr id="7" name="Rectangle 6">
+            <a:extLst>
+              <a:ext uri="{FF2B5EF4-FFF2-40B4-BE49-F238E27FC236}">
+                <a16:creationId xmlns:a16="http://schemas.microsoft.com/office/drawing/2014/main" id="{4827B904-1108-7BCA-5D47-69796B8B2DD4}"/>
+              </a:ext>
+            </a:extLst>
+          </p:cNvPr>
+          <p:cNvSpPr/>
+          <p:nvPr/>
+        </p:nvSpPr>
+        <p:spPr>
+          <a:xfrm>
+            <a:off x="7484364" y="1631632"/>
+            <a:ext cx="1568196" cy="438912"/>
+          </a:xfrm>
+          <a:prstGeom prst="rect">
+            <a:avLst/>
+          </a:prstGeom>
+          <a:solidFill>
+            <a:schemeClr val="accent2"/>
+          </a:solidFill>
+          <a:ln>
+            <a:noFill/>
+          </a:ln>
+        </p:spPr>
+        <p:style>
+          <a:lnRef idx="2">
+            <a:schemeClr val="accent1">
+              <a:shade val="15000"/>
+            </a:schemeClr>
+          </a:lnRef>
+          <a:fillRef idx="1">
+            <a:schemeClr val="accent1"/>
+          </a:fillRef>
+          <a:effectRef idx="0">
+            <a:schemeClr val="accent1"/>
+          </a:effectRef>
+          <a:fontRef idx="minor">
+            <a:schemeClr val="lt1"/>
+          </a:fontRef>
+        </p:style>
+        <p:txBody>
+          <a:bodyPr rtlCol="0" anchor="ctr"/>
+          <a:lstStyle/>
+          <a:p>
+            <a:pPr algn="ctr"/>
+            <a:r>
+              <a:rPr lang="en-US" dirty="0" err="1"/>
+              <a:t>getValue</a:t>
+            </a:r>
+            <a:r>
+              <a:rPr lang="en-US" dirty="0"/>
+              <a:t>(pos)</a:t>
+            </a:r>
+          </a:p>
+        </p:txBody>
+      </p:sp>
+      <p:sp>
+        <p:nvSpPr>
+          <p:cNvPr id="8" name="Rectangle 7">
+            <a:extLst>
+              <a:ext uri="{FF2B5EF4-FFF2-40B4-BE49-F238E27FC236}">
+                <a16:creationId xmlns:a16="http://schemas.microsoft.com/office/drawing/2014/main" id="{CFB41942-7CB9-A42D-8A27-B18DB20B93B1}"/>
+              </a:ext>
+            </a:extLst>
+          </p:cNvPr>
+          <p:cNvSpPr/>
+          <p:nvPr/>
+        </p:nvSpPr>
+        <p:spPr>
+          <a:xfrm>
+            <a:off x="7484364" y="2111692"/>
+            <a:ext cx="1979676" cy="438912"/>
+          </a:xfrm>
+          <a:prstGeom prst="rect">
+            <a:avLst/>
+          </a:prstGeom>
+          <a:solidFill>
+            <a:schemeClr val="accent2"/>
+          </a:solidFill>
+          <a:ln>
+            <a:noFill/>
+          </a:ln>
+        </p:spPr>
+        <p:style>
+          <a:lnRef idx="2">
+            <a:schemeClr val="accent1">
+              <a:shade val="15000"/>
+            </a:schemeClr>
+          </a:lnRef>
+          <a:fillRef idx="1">
+            <a:schemeClr val="accent1"/>
+          </a:fillRef>
+          <a:effectRef idx="0">
+            <a:schemeClr val="accent1"/>
+          </a:effectRef>
+          <a:fontRef idx="minor">
+            <a:schemeClr val="lt1"/>
+          </a:fontRef>
+        </p:style>
+        <p:txBody>
+          <a:bodyPr rtlCol="0" anchor="ctr"/>
+          <a:lstStyle/>
+          <a:p>
+            <a:pPr algn="ctr"/>
+            <a:r>
+              <a:rPr lang="en-US" dirty="0" err="1"/>
+              <a:t>setPosition</a:t>
+            </a:r>
+            <a:r>
+              <a:rPr lang="en-US" dirty="0"/>
+              <a:t>(pos)</a:t>
+            </a:r>
+          </a:p>
+        </p:txBody>
+      </p:sp>
+      <p:sp>
+        <p:nvSpPr>
+          <p:cNvPr id="9" name="TextBox 8">
+            <a:extLst>
+              <a:ext uri="{FF2B5EF4-FFF2-40B4-BE49-F238E27FC236}">
+                <a16:creationId xmlns:a16="http://schemas.microsoft.com/office/drawing/2014/main" id="{147C0B89-ECB8-747B-8C15-81048B439BCF}"/>
+              </a:ext>
+            </a:extLst>
+          </p:cNvPr>
+          <p:cNvSpPr txBox="1"/>
+          <p:nvPr/>
+        </p:nvSpPr>
+        <p:spPr>
+          <a:xfrm>
+            <a:off x="9614916" y="2181272"/>
+            <a:ext cx="1911101" cy="369332"/>
+          </a:xfrm>
+          <a:prstGeom prst="rect">
+            <a:avLst/>
+          </a:prstGeom>
+          <a:noFill/>
+        </p:spPr>
+        <p:txBody>
+          <a:bodyPr wrap="none" rtlCol="0">
+            <a:spAutoFit/>
+          </a:bodyPr>
+          <a:lstStyle/>
+          <a:p>
+            <a:r>
+              <a:rPr lang="en-US" dirty="0"/>
+              <a:t>-&gt;this-&gt;pos = pos</a:t>
+            </a:r>
+          </a:p>
+        </p:txBody>
+      </p:sp>
+      <p:sp>
+        <p:nvSpPr>
+          <p:cNvPr id="10" name="TextBox 9">
+            <a:extLst>
+              <a:ext uri="{FF2B5EF4-FFF2-40B4-BE49-F238E27FC236}">
+                <a16:creationId xmlns:a16="http://schemas.microsoft.com/office/drawing/2014/main" id="{538E9FEE-A68E-1775-34F3-985CB1F5CA4B}"/>
+              </a:ext>
+            </a:extLst>
+          </p:cNvPr>
+          <p:cNvSpPr txBox="1"/>
+          <p:nvPr/>
+        </p:nvSpPr>
+        <p:spPr>
+          <a:xfrm>
+            <a:off x="9614915" y="2759558"/>
+            <a:ext cx="1784527" cy="369332"/>
+          </a:xfrm>
+          <a:prstGeom prst="rect">
+            <a:avLst/>
+          </a:prstGeom>
+          <a:noFill/>
+        </p:spPr>
+        <p:txBody>
+          <a:bodyPr wrap="none" rtlCol="0">
+            <a:spAutoFit/>
+          </a:bodyPr>
+          <a:lstStyle/>
+          <a:p>
+            <a:r>
+              <a:rPr lang="en-US" dirty="0"/>
+              <a:t>-&gt;this-&gt;</a:t>
+            </a:r>
+            <a:r>
+              <a:rPr lang="en-US" dirty="0" err="1"/>
+              <a:t>pos.x</a:t>
+            </a:r>
+            <a:r>
+              <a:rPr lang="en-US" dirty="0"/>
+              <a:t>++</a:t>
+            </a:r>
+          </a:p>
+        </p:txBody>
+      </p:sp>
+      <p:sp>
+        <p:nvSpPr>
+          <p:cNvPr id="11" name="TextBox 10">
+            <a:extLst>
+              <a:ext uri="{FF2B5EF4-FFF2-40B4-BE49-F238E27FC236}">
+                <a16:creationId xmlns:a16="http://schemas.microsoft.com/office/drawing/2014/main" id="{8ADE3E02-D408-36D3-EB11-016C0DCC5692}"/>
+              </a:ext>
+            </a:extLst>
+          </p:cNvPr>
+          <p:cNvSpPr txBox="1"/>
+          <p:nvPr/>
+        </p:nvSpPr>
+        <p:spPr>
+          <a:xfrm>
+            <a:off x="9614915" y="3290980"/>
+            <a:ext cx="2323970" cy="369332"/>
+          </a:xfrm>
+          <a:prstGeom prst="rect">
+            <a:avLst/>
+          </a:prstGeom>
+          <a:noFill/>
+        </p:spPr>
+        <p:txBody>
+          <a:bodyPr wrap="none" rtlCol="0">
+            <a:spAutoFit/>
+          </a:bodyPr>
+          <a:lstStyle/>
+          <a:p>
+            <a:r>
+              <a:rPr lang="en-US" dirty="0"/>
+              <a:t>-&gt;</a:t>
+            </a:r>
+            <a:r>
+              <a:rPr lang="en-US" dirty="0" err="1"/>
+              <a:t>getValue</a:t>
+            </a:r>
+            <a:r>
+              <a:rPr lang="en-US" dirty="0"/>
+              <a:t>(this-&gt;pos)</a:t>
+            </a:r>
+          </a:p>
+        </p:txBody>
+      </p:sp>
+      <p:cxnSp>
+        <p:nvCxnSpPr>
+          <p:cNvPr id="13" name="Straight Arrow Connector 12">
+            <a:extLst>
+              <a:ext uri="{FF2B5EF4-FFF2-40B4-BE49-F238E27FC236}">
+                <a16:creationId xmlns:a16="http://schemas.microsoft.com/office/drawing/2014/main" id="{F61DAB35-4F8A-B0B0-6B13-940EDD7ACD81}"/>
+              </a:ext>
+            </a:extLst>
+          </p:cNvPr>
+          <p:cNvCxnSpPr>
+            <a:cxnSpLocks/>
+            <a:endCxn id="6" idx="1"/>
+          </p:cNvCxnSpPr>
+          <p:nvPr/>
+        </p:nvCxnSpPr>
+        <p:spPr>
+          <a:xfrm>
+            <a:off x="7004304" y="2481024"/>
+            <a:ext cx="480060" cy="901112"/>
+          </a:xfrm>
+          <a:prstGeom prst="straightConnector1">
+            <a:avLst/>
+          </a:prstGeom>
+          <a:ln>
+            <a:tailEnd type="triangle"/>
+          </a:ln>
+        </p:spPr>
+        <p:style>
+          <a:lnRef idx="2">
+            <a:schemeClr val="accent1"/>
+          </a:lnRef>
+          <a:fillRef idx="0">
+            <a:schemeClr val="accent1"/>
+          </a:fillRef>
+          <a:effectRef idx="1">
+            <a:schemeClr val="accent1"/>
+          </a:effectRef>
+          <a:fontRef idx="minor">
+            <a:schemeClr val="tx1"/>
+          </a:fontRef>
+        </p:style>
+      </p:cxnSp>
+      <p:cxnSp>
+        <p:nvCxnSpPr>
+          <p:cNvPr id="15" name="Straight Arrow Connector 14">
+            <a:extLst>
+              <a:ext uri="{FF2B5EF4-FFF2-40B4-BE49-F238E27FC236}">
+                <a16:creationId xmlns:a16="http://schemas.microsoft.com/office/drawing/2014/main" id="{0E9FF257-CF18-2781-636E-5A550F0C971A}"/>
+              </a:ext>
+            </a:extLst>
+          </p:cNvPr>
+          <p:cNvCxnSpPr>
+            <a:cxnSpLocks/>
+            <a:endCxn id="7" idx="1"/>
+          </p:cNvCxnSpPr>
+          <p:nvPr/>
+        </p:nvCxnSpPr>
+        <p:spPr>
+          <a:xfrm flipV="1">
+            <a:off x="7004304" y="1851088"/>
+            <a:ext cx="480060" cy="629936"/>
+          </a:xfrm>
+          <a:prstGeom prst="straightConnector1">
+            <a:avLst/>
+          </a:prstGeom>
+          <a:ln>
+            <a:tailEnd type="triangle"/>
+          </a:ln>
+        </p:spPr>
+        <p:style>
+          <a:lnRef idx="2">
+            <a:schemeClr val="accent1"/>
+          </a:lnRef>
+          <a:fillRef idx="0">
+            <a:schemeClr val="accent1"/>
+          </a:fillRef>
+          <a:effectRef idx="1">
+            <a:schemeClr val="accent1"/>
+          </a:effectRef>
+          <a:fontRef idx="minor">
+            <a:schemeClr val="tx1"/>
+          </a:fontRef>
+        </p:style>
+      </p:cxnSp>
+      <p:sp>
+        <p:nvSpPr>
+          <p:cNvPr id="18" name="TextBox 17">
+            <a:extLst>
+              <a:ext uri="{FF2B5EF4-FFF2-40B4-BE49-F238E27FC236}">
+                <a16:creationId xmlns:a16="http://schemas.microsoft.com/office/drawing/2014/main" id="{8F9F99D9-523D-C3CC-49F2-CAFD9F901AC6}"/>
+              </a:ext>
+            </a:extLst>
+          </p:cNvPr>
+          <p:cNvSpPr txBox="1"/>
+          <p:nvPr/>
+        </p:nvSpPr>
+        <p:spPr>
+          <a:xfrm>
+            <a:off x="5975604" y="1904273"/>
+            <a:ext cx="1357884" cy="646331"/>
+          </a:xfrm>
+          <a:prstGeom prst="rect">
+            <a:avLst/>
+          </a:prstGeom>
+          <a:noFill/>
+        </p:spPr>
+        <p:txBody>
+          <a:bodyPr wrap="square" rtlCol="0">
+            <a:spAutoFit/>
+          </a:bodyPr>
+          <a:lstStyle/>
+          <a:p>
+            <a:r>
+              <a:rPr lang="en-US" dirty="0"/>
+              <a:t>1 of those = REQUIRED</a:t>
+            </a:r>
+          </a:p>
+        </p:txBody>
+      </p:sp>
+      <p:sp>
+        <p:nvSpPr>
+          <p:cNvPr id="19" name="Rectangle 18">
+            <a:extLst>
+              <a:ext uri="{FF2B5EF4-FFF2-40B4-BE49-F238E27FC236}">
+                <a16:creationId xmlns:a16="http://schemas.microsoft.com/office/drawing/2014/main" id="{B6DD332F-4DC8-81EA-1DA9-C5C5ABC25786}"/>
+              </a:ext>
+            </a:extLst>
+          </p:cNvPr>
+          <p:cNvSpPr/>
+          <p:nvPr/>
+        </p:nvSpPr>
+        <p:spPr>
+          <a:xfrm>
+            <a:off x="9464040" y="539496"/>
+            <a:ext cx="1476754" cy="438912"/>
+          </a:xfrm>
+          <a:prstGeom prst="rect">
+            <a:avLst/>
+          </a:prstGeom>
+        </p:spPr>
+        <p:style>
+          <a:lnRef idx="2">
+            <a:schemeClr val="accent1">
+              <a:shade val="15000"/>
+            </a:schemeClr>
+          </a:lnRef>
+          <a:fillRef idx="1">
+            <a:schemeClr val="accent1"/>
+          </a:fillRef>
+          <a:effectRef idx="0">
+            <a:schemeClr val="accent1"/>
+          </a:effectRef>
+          <a:fontRef idx="minor">
+            <a:schemeClr val="lt1"/>
+          </a:fontRef>
+        </p:style>
+        <p:txBody>
+          <a:bodyPr rtlCol="0" anchor="ctr"/>
+          <a:lstStyle/>
+          <a:p>
+            <a:pPr algn="ctr"/>
+            <a:r>
+              <a:rPr lang="en-US" dirty="0" err="1"/>
+              <a:t>solidBrush</a:t>
+            </a:r>
+            <a:endParaRPr lang="en-US" dirty="0"/>
+          </a:p>
+        </p:txBody>
+      </p:sp>
+      <p:sp>
+        <p:nvSpPr>
+          <p:cNvPr id="20" name="Rectangle 19">
+            <a:extLst>
+              <a:ext uri="{FF2B5EF4-FFF2-40B4-BE49-F238E27FC236}">
+                <a16:creationId xmlns:a16="http://schemas.microsoft.com/office/drawing/2014/main" id="{E4D87F87-BFEC-2EF8-A592-BDE64883464F}"/>
+              </a:ext>
+            </a:extLst>
+          </p:cNvPr>
+          <p:cNvSpPr/>
+          <p:nvPr/>
+        </p:nvSpPr>
+        <p:spPr>
+          <a:xfrm>
+            <a:off x="9765790" y="1591735"/>
+            <a:ext cx="3063242" cy="438912"/>
+          </a:xfrm>
+          <a:prstGeom prst="rect">
+            <a:avLst/>
+          </a:prstGeom>
+          <a:solidFill>
+            <a:schemeClr val="accent2"/>
+          </a:solidFill>
+          <a:ln>
+            <a:noFill/>
+          </a:ln>
+        </p:spPr>
+        <p:style>
+          <a:lnRef idx="2">
+            <a:schemeClr val="accent1">
+              <a:shade val="15000"/>
+            </a:schemeClr>
+          </a:lnRef>
+          <a:fillRef idx="1">
+            <a:schemeClr val="accent1"/>
+          </a:fillRef>
+          <a:effectRef idx="0">
+            <a:schemeClr val="accent1"/>
+          </a:effectRef>
+          <a:fontRef idx="minor">
+            <a:schemeClr val="lt1"/>
+          </a:fontRef>
+        </p:style>
+        <p:txBody>
+          <a:bodyPr rtlCol="0" anchor="ctr"/>
+          <a:lstStyle/>
+          <a:p>
+            <a:pPr algn="ctr"/>
+            <a:r>
+              <a:rPr lang="en-US" dirty="0" err="1"/>
+              <a:t>getValue</a:t>
+            </a:r>
+            <a:r>
+              <a:rPr lang="en-US" dirty="0"/>
+              <a:t>(useless argument)</a:t>
+            </a:r>
+          </a:p>
+        </p:txBody>
+      </p:sp>
+      <p:sp>
+        <p:nvSpPr>
+          <p:cNvPr id="21" name="Rectangle 20">
+            <a:extLst>
+              <a:ext uri="{FF2B5EF4-FFF2-40B4-BE49-F238E27FC236}">
+                <a16:creationId xmlns:a16="http://schemas.microsoft.com/office/drawing/2014/main" id="{C26EF176-49A7-84FD-CCF1-7AD3571C0A92}"/>
+              </a:ext>
+            </a:extLst>
+          </p:cNvPr>
+          <p:cNvSpPr/>
+          <p:nvPr/>
+        </p:nvSpPr>
+        <p:spPr>
+          <a:xfrm>
+            <a:off x="8055864" y="-73831"/>
+            <a:ext cx="1677924" cy="914400"/>
+          </a:xfrm>
+          <a:prstGeom prst="rect">
+            <a:avLst/>
+          </a:prstGeom>
+          <a:solidFill>
+            <a:srgbClr val="FF0000"/>
+          </a:solidFill>
+        </p:spPr>
+        <p:style>
+          <a:lnRef idx="2">
+            <a:schemeClr val="accent1">
+              <a:shade val="15000"/>
+            </a:schemeClr>
+          </a:lnRef>
+          <a:fillRef idx="1">
+            <a:schemeClr val="accent1"/>
+          </a:fillRef>
+          <a:effectRef idx="0">
+            <a:schemeClr val="accent1"/>
+          </a:effectRef>
+          <a:fontRef idx="minor">
+            <a:schemeClr val="lt1"/>
+          </a:fontRef>
+        </p:style>
+        <p:txBody>
+          <a:bodyPr rtlCol="0" anchor="ctr"/>
+          <a:lstStyle/>
+          <a:p>
+            <a:pPr algn="ctr"/>
+            <a:r>
+              <a:rPr lang="en-US" dirty="0"/>
+              <a:t>Makes it non-const!</a:t>
+            </a:r>
+          </a:p>
+        </p:txBody>
+      </p:sp>
+      <p:cxnSp>
+        <p:nvCxnSpPr>
+          <p:cNvPr id="22" name="Straight Arrow Connector 21">
+            <a:extLst>
+              <a:ext uri="{FF2B5EF4-FFF2-40B4-BE49-F238E27FC236}">
+                <a16:creationId xmlns:a16="http://schemas.microsoft.com/office/drawing/2014/main" id="{4ADA1C74-82A4-145D-A71C-F1E5E111EEB6}"/>
+              </a:ext>
+            </a:extLst>
+          </p:cNvPr>
+          <p:cNvCxnSpPr>
+            <a:cxnSpLocks/>
+            <a:stCxn id="21" idx="2"/>
+            <a:endCxn id="4" idx="0"/>
+          </p:cNvCxnSpPr>
+          <p:nvPr/>
+        </p:nvCxnSpPr>
+        <p:spPr>
+          <a:xfrm flipH="1">
+            <a:off x="8055864" y="840569"/>
+            <a:ext cx="838962" cy="220135"/>
+          </a:xfrm>
+          <a:prstGeom prst="straightConnector1">
+            <a:avLst/>
+          </a:prstGeom>
+          <a:ln>
+            <a:tailEnd type="triangle"/>
+          </a:ln>
+        </p:spPr>
+        <p:style>
+          <a:lnRef idx="2">
+            <a:schemeClr val="accent1"/>
+          </a:lnRef>
+          <a:fillRef idx="0">
+            <a:schemeClr val="accent1"/>
+          </a:fillRef>
+          <a:effectRef idx="1">
+            <a:schemeClr val="accent1"/>
+          </a:effectRef>
+          <a:fontRef idx="minor">
+            <a:schemeClr val="tx1"/>
+          </a:fontRef>
+        </p:style>
+      </p:cxnSp>
+      <p:sp>
+        <p:nvSpPr>
+          <p:cNvPr id="25" name="TextBox 24">
+            <a:extLst>
+              <a:ext uri="{FF2B5EF4-FFF2-40B4-BE49-F238E27FC236}">
+                <a16:creationId xmlns:a16="http://schemas.microsoft.com/office/drawing/2014/main" id="{688BBDF3-7876-9EC8-DD24-D952F69824CE}"/>
+              </a:ext>
+            </a:extLst>
+          </p:cNvPr>
+          <p:cNvSpPr txBox="1"/>
+          <p:nvPr/>
+        </p:nvSpPr>
+        <p:spPr>
+          <a:xfrm>
+            <a:off x="6654546" y="3821727"/>
+            <a:ext cx="4949190" cy="2585323"/>
+          </a:xfrm>
+          <a:prstGeom prst="rect">
+            <a:avLst/>
+          </a:prstGeom>
+          <a:noFill/>
+        </p:spPr>
+        <p:txBody>
+          <a:bodyPr wrap="square" rtlCol="0">
+            <a:spAutoFit/>
+          </a:bodyPr>
+          <a:lstStyle/>
+          <a:p>
+            <a:pPr marL="285750" indent="-285750">
+              <a:buFontTx/>
+              <a:buChar char="-"/>
+            </a:pPr>
+            <a:r>
+              <a:rPr lang="en-US" dirty="0"/>
+              <a:t>Brush should not be modified</a:t>
+            </a:r>
+          </a:p>
+          <a:p>
+            <a:pPr marL="285750" indent="-285750">
+              <a:buFontTx/>
+              <a:buChar char="-"/>
+            </a:pPr>
+            <a:r>
+              <a:rPr lang="en-US" dirty="0"/>
+              <a:t>Brush should be able to not have a position</a:t>
+            </a:r>
+          </a:p>
+          <a:p>
+            <a:pPr marL="285750" indent="-285750">
+              <a:buFontTx/>
+              <a:buChar char="-"/>
+            </a:pPr>
+            <a:r>
+              <a:rPr lang="en-US" dirty="0"/>
+              <a:t>Anything which has </a:t>
+            </a:r>
+            <a:r>
+              <a:rPr lang="en-US" dirty="0" err="1"/>
+              <a:t>getValue</a:t>
+            </a:r>
+            <a:r>
+              <a:rPr lang="en-US" dirty="0"/>
+              <a:t>(pos) implemented is a brush</a:t>
+            </a:r>
+          </a:p>
+          <a:p>
+            <a:pPr marL="285750" indent="-285750">
+              <a:buFontTx/>
+              <a:buChar char="-"/>
+            </a:pPr>
+            <a:r>
+              <a:rPr lang="en-US" dirty="0"/>
+              <a:t>The logic of a brush should be in one place. So either the brush supports iterating, or the brush just supports </a:t>
+            </a:r>
+            <a:r>
+              <a:rPr lang="en-US" dirty="0" err="1"/>
+              <a:t>getValue</a:t>
+            </a:r>
+            <a:r>
+              <a:rPr lang="en-US" dirty="0"/>
+              <a:t>(pos).</a:t>
+            </a:r>
+          </a:p>
+          <a:p>
+            <a:pPr marL="285750" indent="-285750">
+              <a:buFontTx/>
+              <a:buChar char="-"/>
+            </a:pPr>
+            <a:r>
+              <a:rPr lang="en-US" dirty="0"/>
+              <a:t>On each brush, we should be able to do </a:t>
+            </a:r>
+            <a:r>
+              <a:rPr lang="en-US" dirty="0" err="1"/>
+              <a:t>getValue</a:t>
+            </a:r>
+            <a:r>
+              <a:rPr lang="en-US" dirty="0"/>
+              <a:t>(pos), </a:t>
+            </a:r>
+            <a:r>
+              <a:rPr lang="en-US" dirty="0" err="1"/>
+              <a:t>setPosition</a:t>
+            </a:r>
+            <a:r>
+              <a:rPr lang="en-US" dirty="0"/>
+              <a:t>, ++ and *.</a:t>
+            </a:r>
+          </a:p>
+        </p:txBody>
+      </p:sp>
+      <p:sp>
+        <p:nvSpPr>
+          <p:cNvPr id="26" name="TextBox 25">
+            <a:extLst>
+              <a:ext uri="{FF2B5EF4-FFF2-40B4-BE49-F238E27FC236}">
+                <a16:creationId xmlns:a16="http://schemas.microsoft.com/office/drawing/2014/main" id="{F751C197-8DAD-AFAD-0F1E-C26255A4D0D2}"/>
+              </a:ext>
+            </a:extLst>
+          </p:cNvPr>
+          <p:cNvSpPr txBox="1"/>
+          <p:nvPr/>
+        </p:nvSpPr>
+        <p:spPr>
+          <a:xfrm>
+            <a:off x="649224" y="5458968"/>
+            <a:ext cx="5557675" cy="369332"/>
+          </a:xfrm>
+          <a:prstGeom prst="rect">
+            <a:avLst/>
+          </a:prstGeom>
+          <a:solidFill>
+            <a:srgbClr val="FF0000"/>
+          </a:solidFill>
+        </p:spPr>
+        <p:txBody>
+          <a:bodyPr wrap="none" rtlCol="0">
+            <a:spAutoFit/>
+          </a:bodyPr>
+          <a:lstStyle/>
+          <a:p>
+            <a:r>
+              <a:rPr lang="en-US" dirty="0" err="1"/>
+              <a:t>getIterator</a:t>
+            </a:r>
+            <a:r>
+              <a:rPr lang="en-US" dirty="0"/>
+              <a:t>() -&gt; automatically called if lacking </a:t>
+            </a:r>
+            <a:r>
+              <a:rPr lang="en-US" dirty="0" err="1"/>
+              <a:t>getValue</a:t>
+            </a:r>
+            <a:r>
+              <a:rPr lang="en-US" dirty="0"/>
+              <a:t> </a:t>
+            </a:r>
+          </a:p>
+        </p:txBody>
+      </p:sp>
+    </p:spTree>
+    <p:extLst>
+      <p:ext uri="{BB962C8B-B14F-4D97-AF65-F5344CB8AC3E}">
+        <p14:creationId xmlns:p14="http://schemas.microsoft.com/office/powerpoint/2010/main" val="3649355078"/>
       </p:ext>
     </p:extLst>
   </p:cSld>

</xml_diff>